<commit_message>
adding calculation of correleation coef
</commit_message>
<xml_diff>
--- a/sim_tutorial.pptx
+++ b/sim_tutorial.pptx
@@ -5,11 +5,12 @@
     <p:sldMasterId id="2147483648" r:id="rId1"/>
   </p:sldMasterIdLst>
   <p:notesMasterIdLst>
-    <p:notesMasterId r:id="rId4"/>
+    <p:notesMasterId r:id="rId5"/>
   </p:notesMasterIdLst>
   <p:sldIdLst>
     <p:sldId id="256" r:id="rId2"/>
     <p:sldId id="257" r:id="rId3"/>
+    <p:sldId id="258" r:id="rId4"/>
   </p:sldIdLst>
   <p:sldSz cx="12192000" cy="6858000"/>
   <p:notesSz cx="6858000" cy="9144000"/>
@@ -198,7 +199,7 @@
           <a:p>
             <a:fld id="{3D983C11-D92A-8449-A9D8-9C4DCAF04B15}" type="datetimeFigureOut">
               <a:rPr lang="en-US" smtClean="0"/>
-              <a:t>9/12/18</a:t>
+              <a:t>10/29/18</a:t>
             </a:fld>
             <a:endParaRPr lang="en-US"/>
           </a:p>
@@ -780,7 +781,7 @@
           <a:p>
             <a:fld id="{63E824C4-E682-B943-B6E6-CEBFF864C9AB}" type="datetimeFigureOut">
               <a:rPr lang="en-US" smtClean="0"/>
-              <a:t>9/12/18</a:t>
+              <a:t>10/29/18</a:t>
             </a:fld>
             <a:endParaRPr lang="en-US"/>
           </a:p>
@@ -978,7 +979,7 @@
           <a:p>
             <a:fld id="{63E824C4-E682-B943-B6E6-CEBFF864C9AB}" type="datetimeFigureOut">
               <a:rPr lang="en-US" smtClean="0"/>
-              <a:t>9/12/18</a:t>
+              <a:t>10/29/18</a:t>
             </a:fld>
             <a:endParaRPr lang="en-US"/>
           </a:p>
@@ -1186,7 +1187,7 @@
           <a:p>
             <a:fld id="{63E824C4-E682-B943-B6E6-CEBFF864C9AB}" type="datetimeFigureOut">
               <a:rPr lang="en-US" smtClean="0"/>
-              <a:t>9/12/18</a:t>
+              <a:t>10/29/18</a:t>
             </a:fld>
             <a:endParaRPr lang="en-US"/>
           </a:p>
@@ -1384,7 +1385,7 @@
           <a:p>
             <a:fld id="{63E824C4-E682-B943-B6E6-CEBFF864C9AB}" type="datetimeFigureOut">
               <a:rPr lang="en-US" smtClean="0"/>
-              <a:t>9/12/18</a:t>
+              <a:t>10/29/18</a:t>
             </a:fld>
             <a:endParaRPr lang="en-US"/>
           </a:p>
@@ -1659,7 +1660,7 @@
           <a:p>
             <a:fld id="{63E824C4-E682-B943-B6E6-CEBFF864C9AB}" type="datetimeFigureOut">
               <a:rPr lang="en-US" smtClean="0"/>
-              <a:t>9/12/18</a:t>
+              <a:t>10/29/18</a:t>
             </a:fld>
             <a:endParaRPr lang="en-US"/>
           </a:p>
@@ -1924,7 +1925,7 @@
           <a:p>
             <a:fld id="{63E824C4-E682-B943-B6E6-CEBFF864C9AB}" type="datetimeFigureOut">
               <a:rPr lang="en-US" smtClean="0"/>
-              <a:t>9/12/18</a:t>
+              <a:t>10/29/18</a:t>
             </a:fld>
             <a:endParaRPr lang="en-US"/>
           </a:p>
@@ -2336,7 +2337,7 @@
           <a:p>
             <a:fld id="{63E824C4-E682-B943-B6E6-CEBFF864C9AB}" type="datetimeFigureOut">
               <a:rPr lang="en-US" smtClean="0"/>
-              <a:t>9/12/18</a:t>
+              <a:t>10/29/18</a:t>
             </a:fld>
             <a:endParaRPr lang="en-US"/>
           </a:p>
@@ -2477,7 +2478,7 @@
           <a:p>
             <a:fld id="{63E824C4-E682-B943-B6E6-CEBFF864C9AB}" type="datetimeFigureOut">
               <a:rPr lang="en-US" smtClean="0"/>
-              <a:t>9/12/18</a:t>
+              <a:t>10/29/18</a:t>
             </a:fld>
             <a:endParaRPr lang="en-US"/>
           </a:p>
@@ -2590,7 +2591,7 @@
           <a:p>
             <a:fld id="{63E824C4-E682-B943-B6E6-CEBFF864C9AB}" type="datetimeFigureOut">
               <a:rPr lang="en-US" smtClean="0"/>
-              <a:t>9/12/18</a:t>
+              <a:t>10/29/18</a:t>
             </a:fld>
             <a:endParaRPr lang="en-US"/>
           </a:p>
@@ -2901,7 +2902,7 @@
           <a:p>
             <a:fld id="{63E824C4-E682-B943-B6E6-CEBFF864C9AB}" type="datetimeFigureOut">
               <a:rPr lang="en-US" smtClean="0"/>
-              <a:t>9/12/18</a:t>
+              <a:t>10/29/18</a:t>
             </a:fld>
             <a:endParaRPr lang="en-US"/>
           </a:p>
@@ -3189,7 +3190,7 @@
           <a:p>
             <a:fld id="{63E824C4-E682-B943-B6E6-CEBFF864C9AB}" type="datetimeFigureOut">
               <a:rPr lang="en-US" smtClean="0"/>
-              <a:t>9/12/18</a:t>
+              <a:t>10/29/18</a:t>
             </a:fld>
             <a:endParaRPr lang="en-US"/>
           </a:p>
@@ -3430,7 +3431,7 @@
           <a:p>
             <a:fld id="{63E824C4-E682-B943-B6E6-CEBFF864C9AB}" type="datetimeFigureOut">
               <a:rPr lang="en-US" smtClean="0"/>
-              <a:t>9/12/18</a:t>
+              <a:t>10/29/18</a:t>
             </a:fld>
             <a:endParaRPr lang="en-US"/>
           </a:p>
@@ -9829,6 +9830,3300 @@
     <p:extLst>
       <p:ext uri="{BB962C8B-B14F-4D97-AF65-F5344CB8AC3E}">
         <p14:creationId xmlns:p14="http://schemas.microsoft.com/office/powerpoint/2010/main" val="106379202"/>
+      </p:ext>
+    </p:extLst>
+  </p:cSld>
+  <p:clrMapOvr>
+    <a:masterClrMapping/>
+  </p:clrMapOvr>
+</p:sld>
+</file>
+
+<file path=ppt/slides/slide3.xml><?xml version="1.0" encoding="utf-8"?>
+<p:sld xmlns:a="http://schemas.openxmlformats.org/drawingml/2006/main" xmlns:r="http://schemas.openxmlformats.org/officeDocument/2006/relationships" xmlns:p="http://schemas.openxmlformats.org/presentationml/2006/main">
+  <p:cSld>
+    <p:spTree>
+      <p:nvGrpSpPr>
+        <p:cNvPr id="1" name=""/>
+        <p:cNvGrpSpPr/>
+        <p:nvPr/>
+      </p:nvGrpSpPr>
+      <p:grpSpPr>
+        <a:xfrm>
+          <a:off x="0" y="0"/>
+          <a:ext cx="0" cy="0"/>
+          <a:chOff x="0" y="0"/>
+          <a:chExt cx="0" cy="0"/>
+        </a:xfrm>
+      </p:grpSpPr>
+      <p:sp>
+        <p:nvSpPr>
+          <p:cNvPr id="4" name="TextBox 3">
+            <a:extLst>
+              <a:ext uri="{FF2B5EF4-FFF2-40B4-BE49-F238E27FC236}">
+                <a16:creationId xmlns:a16="http://schemas.microsoft.com/office/drawing/2014/main" id="{803832A8-DF95-764E-BB41-7AA9F9F491BF}"/>
+              </a:ext>
+            </a:extLst>
+          </p:cNvPr>
+          <p:cNvSpPr txBox="1"/>
+          <p:nvPr/>
+        </p:nvSpPr>
+        <p:spPr>
+          <a:xfrm>
+            <a:off x="1037719" y="92381"/>
+            <a:ext cx="5205656" cy="369332"/>
+          </a:xfrm>
+          <a:prstGeom prst="rect">
+            <a:avLst/>
+          </a:prstGeom>
+          <a:noFill/>
+        </p:spPr>
+        <p:txBody>
+          <a:bodyPr wrap="none" rtlCol="0">
+            <a:spAutoFit/>
+          </a:bodyPr>
+          <a:lstStyle/>
+          <a:p>
+            <a:r>
+              <a:rPr lang="en-US" dirty="0"/>
+              <a:t>Simulation 3 – Now also shifting frequency and phase</a:t>
+            </a:r>
+          </a:p>
+        </p:txBody>
+      </p:sp>
+      <p:sp>
+        <p:nvSpPr>
+          <p:cNvPr id="5" name="Rectangle 4">
+            <a:extLst>
+              <a:ext uri="{FF2B5EF4-FFF2-40B4-BE49-F238E27FC236}">
+                <a16:creationId xmlns:a16="http://schemas.microsoft.com/office/drawing/2014/main" id="{1DAF619D-32F2-D342-97F1-B5C8F0BBD8D5}"/>
+              </a:ext>
+            </a:extLst>
+          </p:cNvPr>
+          <p:cNvSpPr/>
+          <p:nvPr/>
+        </p:nvSpPr>
+        <p:spPr>
+          <a:xfrm>
+            <a:off x="195209" y="1253447"/>
+            <a:ext cx="11763910" cy="5106256"/>
+          </a:xfrm>
+          <a:prstGeom prst="rect">
+            <a:avLst/>
+          </a:prstGeom>
+          <a:noFill/>
+        </p:spPr>
+        <p:style>
+          <a:lnRef idx="2">
+            <a:schemeClr val="accent1">
+              <a:shade val="50000"/>
+            </a:schemeClr>
+          </a:lnRef>
+          <a:fillRef idx="1">
+            <a:schemeClr val="accent1"/>
+          </a:fillRef>
+          <a:effectRef idx="0">
+            <a:schemeClr val="accent1"/>
+          </a:effectRef>
+          <a:fontRef idx="minor">
+            <a:schemeClr val="lt1"/>
+          </a:fontRef>
+        </p:style>
+        <p:txBody>
+          <a:bodyPr rtlCol="0" anchor="ctr"/>
+          <a:lstStyle/>
+          <a:p>
+            <a:pPr algn="ctr"/>
+            <a:endParaRPr lang="en-US"/>
+          </a:p>
+        </p:txBody>
+      </p:sp>
+      <p:cxnSp>
+        <p:nvCxnSpPr>
+          <p:cNvPr id="6" name="Straight Connector 5">
+            <a:extLst>
+              <a:ext uri="{FF2B5EF4-FFF2-40B4-BE49-F238E27FC236}">
+                <a16:creationId xmlns:a16="http://schemas.microsoft.com/office/drawing/2014/main" id="{23EE3EAB-8FC6-4342-B847-995F0634EA42}"/>
+              </a:ext>
+            </a:extLst>
+          </p:cNvPr>
+          <p:cNvCxnSpPr/>
+          <p:nvPr/>
+        </p:nvCxnSpPr>
+        <p:spPr>
+          <a:xfrm>
+            <a:off x="1325366" y="1253447"/>
+            <a:ext cx="0" cy="5106256"/>
+          </a:xfrm>
+          <a:prstGeom prst="line">
+            <a:avLst/>
+          </a:prstGeom>
+        </p:spPr>
+        <p:style>
+          <a:lnRef idx="1">
+            <a:schemeClr val="accent1"/>
+          </a:lnRef>
+          <a:fillRef idx="0">
+            <a:schemeClr val="accent1"/>
+          </a:fillRef>
+          <a:effectRef idx="0">
+            <a:schemeClr val="accent1"/>
+          </a:effectRef>
+          <a:fontRef idx="minor">
+            <a:schemeClr val="tx1"/>
+          </a:fontRef>
+        </p:style>
+      </p:cxnSp>
+      <p:cxnSp>
+        <p:nvCxnSpPr>
+          <p:cNvPr id="7" name="Straight Connector 6">
+            <a:extLst>
+              <a:ext uri="{FF2B5EF4-FFF2-40B4-BE49-F238E27FC236}">
+                <a16:creationId xmlns:a16="http://schemas.microsoft.com/office/drawing/2014/main" id="{CCDC6EBF-1C0E-CC41-B6CC-96BD15D6E443}"/>
+              </a:ext>
+            </a:extLst>
+          </p:cNvPr>
+          <p:cNvCxnSpPr/>
+          <p:nvPr/>
+        </p:nvCxnSpPr>
+        <p:spPr>
+          <a:xfrm>
+            <a:off x="2517810" y="1253447"/>
+            <a:ext cx="0" cy="5106256"/>
+          </a:xfrm>
+          <a:prstGeom prst="line">
+            <a:avLst/>
+          </a:prstGeom>
+        </p:spPr>
+        <p:style>
+          <a:lnRef idx="1">
+            <a:schemeClr val="accent1"/>
+          </a:lnRef>
+          <a:fillRef idx="0">
+            <a:schemeClr val="accent1"/>
+          </a:fillRef>
+          <a:effectRef idx="0">
+            <a:schemeClr val="accent1"/>
+          </a:effectRef>
+          <a:fontRef idx="minor">
+            <a:schemeClr val="tx1"/>
+          </a:fontRef>
+        </p:style>
+      </p:cxnSp>
+      <p:cxnSp>
+        <p:nvCxnSpPr>
+          <p:cNvPr id="8" name="Straight Connector 7">
+            <a:extLst>
+              <a:ext uri="{FF2B5EF4-FFF2-40B4-BE49-F238E27FC236}">
+                <a16:creationId xmlns:a16="http://schemas.microsoft.com/office/drawing/2014/main" id="{B03B3FB5-4B1A-BF43-9A86-B31E863C6C70}"/>
+              </a:ext>
+            </a:extLst>
+          </p:cNvPr>
+          <p:cNvCxnSpPr/>
+          <p:nvPr/>
+        </p:nvCxnSpPr>
+        <p:spPr>
+          <a:xfrm>
+            <a:off x="3710254" y="1253447"/>
+            <a:ext cx="0" cy="5106256"/>
+          </a:xfrm>
+          <a:prstGeom prst="line">
+            <a:avLst/>
+          </a:prstGeom>
+        </p:spPr>
+        <p:style>
+          <a:lnRef idx="1">
+            <a:schemeClr val="accent1"/>
+          </a:lnRef>
+          <a:fillRef idx="0">
+            <a:schemeClr val="accent1"/>
+          </a:fillRef>
+          <a:effectRef idx="0">
+            <a:schemeClr val="accent1"/>
+          </a:effectRef>
+          <a:fontRef idx="minor">
+            <a:schemeClr val="tx1"/>
+          </a:fontRef>
+        </p:style>
+      </p:cxnSp>
+      <p:cxnSp>
+        <p:nvCxnSpPr>
+          <p:cNvPr id="9" name="Straight Connector 8">
+            <a:extLst>
+              <a:ext uri="{FF2B5EF4-FFF2-40B4-BE49-F238E27FC236}">
+                <a16:creationId xmlns:a16="http://schemas.microsoft.com/office/drawing/2014/main" id="{4292A0F3-7BE2-1F41-A8B4-A7B5F66CED6A}"/>
+              </a:ext>
+            </a:extLst>
+          </p:cNvPr>
+          <p:cNvCxnSpPr/>
+          <p:nvPr/>
+        </p:nvCxnSpPr>
+        <p:spPr>
+          <a:xfrm>
+            <a:off x="4902698" y="1253447"/>
+            <a:ext cx="0" cy="5106256"/>
+          </a:xfrm>
+          <a:prstGeom prst="line">
+            <a:avLst/>
+          </a:prstGeom>
+        </p:spPr>
+        <p:style>
+          <a:lnRef idx="1">
+            <a:schemeClr val="accent1"/>
+          </a:lnRef>
+          <a:fillRef idx="0">
+            <a:schemeClr val="accent1"/>
+          </a:fillRef>
+          <a:effectRef idx="0">
+            <a:schemeClr val="accent1"/>
+          </a:effectRef>
+          <a:fontRef idx="minor">
+            <a:schemeClr val="tx1"/>
+          </a:fontRef>
+        </p:style>
+      </p:cxnSp>
+      <p:cxnSp>
+        <p:nvCxnSpPr>
+          <p:cNvPr id="10" name="Straight Connector 9">
+            <a:extLst>
+              <a:ext uri="{FF2B5EF4-FFF2-40B4-BE49-F238E27FC236}">
+                <a16:creationId xmlns:a16="http://schemas.microsoft.com/office/drawing/2014/main" id="{573F58A7-2E87-4B40-9E16-02991B5FE5AB}"/>
+              </a:ext>
+            </a:extLst>
+          </p:cNvPr>
+          <p:cNvCxnSpPr/>
+          <p:nvPr/>
+        </p:nvCxnSpPr>
+        <p:spPr>
+          <a:xfrm>
+            <a:off x="6095142" y="1253447"/>
+            <a:ext cx="0" cy="5106256"/>
+          </a:xfrm>
+          <a:prstGeom prst="line">
+            <a:avLst/>
+          </a:prstGeom>
+        </p:spPr>
+        <p:style>
+          <a:lnRef idx="1">
+            <a:schemeClr val="accent1"/>
+          </a:lnRef>
+          <a:fillRef idx="0">
+            <a:schemeClr val="accent1"/>
+          </a:fillRef>
+          <a:effectRef idx="0">
+            <a:schemeClr val="accent1"/>
+          </a:effectRef>
+          <a:fontRef idx="minor">
+            <a:schemeClr val="tx1"/>
+          </a:fontRef>
+        </p:style>
+      </p:cxnSp>
+      <p:cxnSp>
+        <p:nvCxnSpPr>
+          <p:cNvPr id="11" name="Straight Connector 10">
+            <a:extLst>
+              <a:ext uri="{FF2B5EF4-FFF2-40B4-BE49-F238E27FC236}">
+                <a16:creationId xmlns:a16="http://schemas.microsoft.com/office/drawing/2014/main" id="{7FE44187-8DD1-3B4B-9B23-D6D710160FDC}"/>
+              </a:ext>
+            </a:extLst>
+          </p:cNvPr>
+          <p:cNvCxnSpPr/>
+          <p:nvPr/>
+        </p:nvCxnSpPr>
+        <p:spPr>
+          <a:xfrm>
+            <a:off x="7287586" y="1253447"/>
+            <a:ext cx="0" cy="5106256"/>
+          </a:xfrm>
+          <a:prstGeom prst="line">
+            <a:avLst/>
+          </a:prstGeom>
+        </p:spPr>
+        <p:style>
+          <a:lnRef idx="1">
+            <a:schemeClr val="accent1"/>
+          </a:lnRef>
+          <a:fillRef idx="0">
+            <a:schemeClr val="accent1"/>
+          </a:fillRef>
+          <a:effectRef idx="0">
+            <a:schemeClr val="accent1"/>
+          </a:effectRef>
+          <a:fontRef idx="minor">
+            <a:schemeClr val="tx1"/>
+          </a:fontRef>
+        </p:style>
+      </p:cxnSp>
+      <p:cxnSp>
+        <p:nvCxnSpPr>
+          <p:cNvPr id="12" name="Straight Connector 11">
+            <a:extLst>
+              <a:ext uri="{FF2B5EF4-FFF2-40B4-BE49-F238E27FC236}">
+                <a16:creationId xmlns:a16="http://schemas.microsoft.com/office/drawing/2014/main" id="{06D3DC1E-267F-0948-8C8A-370BEE1C7FE9}"/>
+              </a:ext>
+            </a:extLst>
+          </p:cNvPr>
+          <p:cNvCxnSpPr/>
+          <p:nvPr/>
+        </p:nvCxnSpPr>
+        <p:spPr>
+          <a:xfrm>
+            <a:off x="8480030" y="1253447"/>
+            <a:ext cx="0" cy="5106256"/>
+          </a:xfrm>
+          <a:prstGeom prst="line">
+            <a:avLst/>
+          </a:prstGeom>
+        </p:spPr>
+        <p:style>
+          <a:lnRef idx="1">
+            <a:schemeClr val="accent1"/>
+          </a:lnRef>
+          <a:fillRef idx="0">
+            <a:schemeClr val="accent1"/>
+          </a:fillRef>
+          <a:effectRef idx="0">
+            <a:schemeClr val="accent1"/>
+          </a:effectRef>
+          <a:fontRef idx="minor">
+            <a:schemeClr val="tx1"/>
+          </a:fontRef>
+        </p:style>
+      </p:cxnSp>
+      <p:cxnSp>
+        <p:nvCxnSpPr>
+          <p:cNvPr id="13" name="Straight Connector 12">
+            <a:extLst>
+              <a:ext uri="{FF2B5EF4-FFF2-40B4-BE49-F238E27FC236}">
+                <a16:creationId xmlns:a16="http://schemas.microsoft.com/office/drawing/2014/main" id="{F91B7DC9-8A84-8246-B58F-069AC03EA2D9}"/>
+              </a:ext>
+            </a:extLst>
+          </p:cNvPr>
+          <p:cNvCxnSpPr/>
+          <p:nvPr/>
+        </p:nvCxnSpPr>
+        <p:spPr>
+          <a:xfrm>
+            <a:off x="9672474" y="1253447"/>
+            <a:ext cx="0" cy="5106256"/>
+          </a:xfrm>
+          <a:prstGeom prst="line">
+            <a:avLst/>
+          </a:prstGeom>
+        </p:spPr>
+        <p:style>
+          <a:lnRef idx="1">
+            <a:schemeClr val="accent1"/>
+          </a:lnRef>
+          <a:fillRef idx="0">
+            <a:schemeClr val="accent1"/>
+          </a:fillRef>
+          <a:effectRef idx="0">
+            <a:schemeClr val="accent1"/>
+          </a:effectRef>
+          <a:fontRef idx="minor">
+            <a:schemeClr val="tx1"/>
+          </a:fontRef>
+        </p:style>
+      </p:cxnSp>
+      <p:cxnSp>
+        <p:nvCxnSpPr>
+          <p:cNvPr id="14" name="Straight Connector 13">
+            <a:extLst>
+              <a:ext uri="{FF2B5EF4-FFF2-40B4-BE49-F238E27FC236}">
+                <a16:creationId xmlns:a16="http://schemas.microsoft.com/office/drawing/2014/main" id="{DF196DF9-498B-7C4C-AA2E-EEB87A64A720}"/>
+              </a:ext>
+            </a:extLst>
+          </p:cNvPr>
+          <p:cNvCxnSpPr/>
+          <p:nvPr/>
+        </p:nvCxnSpPr>
+        <p:spPr>
+          <a:xfrm>
+            <a:off x="10864921" y="1253447"/>
+            <a:ext cx="0" cy="5106256"/>
+          </a:xfrm>
+          <a:prstGeom prst="line">
+            <a:avLst/>
+          </a:prstGeom>
+        </p:spPr>
+        <p:style>
+          <a:lnRef idx="1">
+            <a:schemeClr val="accent1"/>
+          </a:lnRef>
+          <a:fillRef idx="0">
+            <a:schemeClr val="accent1"/>
+          </a:fillRef>
+          <a:effectRef idx="0">
+            <a:schemeClr val="accent1"/>
+          </a:effectRef>
+          <a:fontRef idx="minor">
+            <a:schemeClr val="tx1"/>
+          </a:fontRef>
+        </p:style>
+      </p:cxnSp>
+      <p:cxnSp>
+        <p:nvCxnSpPr>
+          <p:cNvPr id="15" name="Straight Connector 14">
+            <a:extLst>
+              <a:ext uri="{FF2B5EF4-FFF2-40B4-BE49-F238E27FC236}">
+                <a16:creationId xmlns:a16="http://schemas.microsoft.com/office/drawing/2014/main" id="{07DB17FE-244B-C94A-A5B2-A00B7EA60FDD}"/>
+              </a:ext>
+            </a:extLst>
+          </p:cNvPr>
+          <p:cNvCxnSpPr>
+            <a:cxnSpLocks/>
+            <a:stCxn id="5" idx="1"/>
+            <a:endCxn id="5" idx="3"/>
+          </p:cNvCxnSpPr>
+          <p:nvPr/>
+        </p:nvCxnSpPr>
+        <p:spPr>
+          <a:xfrm>
+            <a:off x="195209" y="3806575"/>
+            <a:ext cx="11763910" cy="0"/>
+          </a:xfrm>
+          <a:prstGeom prst="line">
+            <a:avLst/>
+          </a:prstGeom>
+        </p:spPr>
+        <p:style>
+          <a:lnRef idx="1">
+            <a:schemeClr val="accent1"/>
+          </a:lnRef>
+          <a:fillRef idx="0">
+            <a:schemeClr val="accent1"/>
+          </a:fillRef>
+          <a:effectRef idx="0">
+            <a:schemeClr val="accent1"/>
+          </a:effectRef>
+          <a:fontRef idx="minor">
+            <a:schemeClr val="tx1"/>
+          </a:fontRef>
+        </p:style>
+      </p:cxnSp>
+      <p:cxnSp>
+        <p:nvCxnSpPr>
+          <p:cNvPr id="16" name="Straight Connector 15">
+            <a:extLst>
+              <a:ext uri="{FF2B5EF4-FFF2-40B4-BE49-F238E27FC236}">
+                <a16:creationId xmlns:a16="http://schemas.microsoft.com/office/drawing/2014/main" id="{F551A48A-586E-6B46-A19A-36F5F17820FA}"/>
+              </a:ext>
+            </a:extLst>
+          </p:cNvPr>
+          <p:cNvCxnSpPr>
+            <a:cxnSpLocks/>
+          </p:cNvCxnSpPr>
+          <p:nvPr/>
+        </p:nvCxnSpPr>
+        <p:spPr>
+          <a:xfrm>
+            <a:off x="1325366" y="2486346"/>
+            <a:ext cx="7154664" cy="0"/>
+          </a:xfrm>
+          <a:prstGeom prst="line">
+            <a:avLst/>
+          </a:prstGeom>
+        </p:spPr>
+        <p:style>
+          <a:lnRef idx="1">
+            <a:schemeClr val="accent1"/>
+          </a:lnRef>
+          <a:fillRef idx="0">
+            <a:schemeClr val="accent1"/>
+          </a:fillRef>
+          <a:effectRef idx="0">
+            <a:schemeClr val="accent1"/>
+          </a:effectRef>
+          <a:fontRef idx="minor">
+            <a:schemeClr val="tx1"/>
+          </a:fontRef>
+        </p:style>
+      </p:cxnSp>
+      <p:cxnSp>
+        <p:nvCxnSpPr>
+          <p:cNvPr id="17" name="Straight Connector 16">
+            <a:extLst>
+              <a:ext uri="{FF2B5EF4-FFF2-40B4-BE49-F238E27FC236}">
+                <a16:creationId xmlns:a16="http://schemas.microsoft.com/office/drawing/2014/main" id="{68BAE747-B80D-334B-B697-EDFB63EE8F67}"/>
+              </a:ext>
+            </a:extLst>
+          </p:cNvPr>
+          <p:cNvCxnSpPr>
+            <a:cxnSpLocks/>
+          </p:cNvCxnSpPr>
+          <p:nvPr/>
+        </p:nvCxnSpPr>
+        <p:spPr>
+          <a:xfrm>
+            <a:off x="1325366" y="4940157"/>
+            <a:ext cx="7154664" cy="0"/>
+          </a:xfrm>
+          <a:prstGeom prst="line">
+            <a:avLst/>
+          </a:prstGeom>
+        </p:spPr>
+        <p:style>
+          <a:lnRef idx="1">
+            <a:schemeClr val="accent1"/>
+          </a:lnRef>
+          <a:fillRef idx="0">
+            <a:schemeClr val="accent1"/>
+          </a:fillRef>
+          <a:effectRef idx="0">
+            <a:schemeClr val="accent1"/>
+          </a:effectRef>
+          <a:fontRef idx="minor">
+            <a:schemeClr val="tx1"/>
+          </a:fontRef>
+        </p:style>
+      </p:cxnSp>
+      <p:cxnSp>
+        <p:nvCxnSpPr>
+          <p:cNvPr id="18" name="Straight Connector 17">
+            <a:extLst>
+              <a:ext uri="{FF2B5EF4-FFF2-40B4-BE49-F238E27FC236}">
+                <a16:creationId xmlns:a16="http://schemas.microsoft.com/office/drawing/2014/main" id="{2A540D0A-B139-3847-AA40-EEF97392B84C}"/>
+              </a:ext>
+            </a:extLst>
+          </p:cNvPr>
+          <p:cNvCxnSpPr>
+            <a:cxnSpLocks/>
+          </p:cNvCxnSpPr>
+          <p:nvPr/>
+        </p:nvCxnSpPr>
+        <p:spPr>
+          <a:xfrm>
+            <a:off x="2517810" y="1859622"/>
+            <a:ext cx="3577332" cy="0"/>
+          </a:xfrm>
+          <a:prstGeom prst="line">
+            <a:avLst/>
+          </a:prstGeom>
+        </p:spPr>
+        <p:style>
+          <a:lnRef idx="1">
+            <a:schemeClr val="accent1"/>
+          </a:lnRef>
+          <a:fillRef idx="0">
+            <a:schemeClr val="accent1"/>
+          </a:fillRef>
+          <a:effectRef idx="0">
+            <a:schemeClr val="accent1"/>
+          </a:effectRef>
+          <a:fontRef idx="minor">
+            <a:schemeClr val="tx1"/>
+          </a:fontRef>
+        </p:style>
+      </p:cxnSp>
+      <p:cxnSp>
+        <p:nvCxnSpPr>
+          <p:cNvPr id="19" name="Straight Connector 18">
+            <a:extLst>
+              <a:ext uri="{FF2B5EF4-FFF2-40B4-BE49-F238E27FC236}">
+                <a16:creationId xmlns:a16="http://schemas.microsoft.com/office/drawing/2014/main" id="{F8AF85A7-1FCC-2B43-A4B3-60048B367DAD}"/>
+              </a:ext>
+            </a:extLst>
+          </p:cNvPr>
+          <p:cNvCxnSpPr>
+            <a:cxnSpLocks/>
+          </p:cNvCxnSpPr>
+          <p:nvPr/>
+        </p:nvCxnSpPr>
+        <p:spPr>
+          <a:xfrm>
+            <a:off x="2517810" y="5669622"/>
+            <a:ext cx="3577332" cy="0"/>
+          </a:xfrm>
+          <a:prstGeom prst="line">
+            <a:avLst/>
+          </a:prstGeom>
+        </p:spPr>
+        <p:style>
+          <a:lnRef idx="1">
+            <a:schemeClr val="accent1"/>
+          </a:lnRef>
+          <a:fillRef idx="0">
+            <a:schemeClr val="accent1"/>
+          </a:fillRef>
+          <a:effectRef idx="0">
+            <a:schemeClr val="accent1"/>
+          </a:effectRef>
+          <a:fontRef idx="minor">
+            <a:schemeClr val="tx1"/>
+          </a:fontRef>
+        </p:style>
+      </p:cxnSp>
+      <p:cxnSp>
+        <p:nvCxnSpPr>
+          <p:cNvPr id="20" name="Straight Connector 19">
+            <a:extLst>
+              <a:ext uri="{FF2B5EF4-FFF2-40B4-BE49-F238E27FC236}">
+                <a16:creationId xmlns:a16="http://schemas.microsoft.com/office/drawing/2014/main" id="{F52F7368-FD7B-104E-B744-5FBDE2C4C4C1}"/>
+              </a:ext>
+            </a:extLst>
+          </p:cNvPr>
+          <p:cNvCxnSpPr>
+            <a:cxnSpLocks/>
+          </p:cNvCxnSpPr>
+          <p:nvPr/>
+        </p:nvCxnSpPr>
+        <p:spPr>
+          <a:xfrm>
+            <a:off x="2517810" y="3162727"/>
+            <a:ext cx="3559354" cy="0"/>
+          </a:xfrm>
+          <a:prstGeom prst="line">
+            <a:avLst/>
+          </a:prstGeom>
+        </p:spPr>
+        <p:style>
+          <a:lnRef idx="1">
+            <a:schemeClr val="accent1"/>
+          </a:lnRef>
+          <a:fillRef idx="0">
+            <a:schemeClr val="accent1"/>
+          </a:fillRef>
+          <a:effectRef idx="0">
+            <a:schemeClr val="accent1"/>
+          </a:effectRef>
+          <a:fontRef idx="minor">
+            <a:schemeClr val="tx1"/>
+          </a:fontRef>
+        </p:style>
+      </p:cxnSp>
+      <p:cxnSp>
+        <p:nvCxnSpPr>
+          <p:cNvPr id="21" name="Straight Connector 20">
+            <a:extLst>
+              <a:ext uri="{FF2B5EF4-FFF2-40B4-BE49-F238E27FC236}">
+                <a16:creationId xmlns:a16="http://schemas.microsoft.com/office/drawing/2014/main" id="{E8901CE5-E029-294D-B16B-151C6FB10B49}"/>
+              </a:ext>
+            </a:extLst>
+          </p:cNvPr>
+          <p:cNvCxnSpPr>
+            <a:cxnSpLocks/>
+          </p:cNvCxnSpPr>
+          <p:nvPr/>
+        </p:nvCxnSpPr>
+        <p:spPr>
+          <a:xfrm>
+            <a:off x="2517810" y="4352817"/>
+            <a:ext cx="3577332" cy="0"/>
+          </a:xfrm>
+          <a:prstGeom prst="line">
+            <a:avLst/>
+          </a:prstGeom>
+        </p:spPr>
+        <p:style>
+          <a:lnRef idx="1">
+            <a:schemeClr val="accent1"/>
+          </a:lnRef>
+          <a:fillRef idx="0">
+            <a:schemeClr val="accent1"/>
+          </a:fillRef>
+          <a:effectRef idx="0">
+            <a:schemeClr val="accent1"/>
+          </a:effectRef>
+          <a:fontRef idx="minor">
+            <a:schemeClr val="tx1"/>
+          </a:fontRef>
+        </p:style>
+      </p:cxnSp>
+      <p:sp>
+        <p:nvSpPr>
+          <p:cNvPr id="22" name="TextBox 21">
+            <a:extLst>
+              <a:ext uri="{FF2B5EF4-FFF2-40B4-BE49-F238E27FC236}">
+                <a16:creationId xmlns:a16="http://schemas.microsoft.com/office/drawing/2014/main" id="{4E332D22-9A13-C64B-80E0-1C852D93E6A7}"/>
+              </a:ext>
+            </a:extLst>
+          </p:cNvPr>
+          <p:cNvSpPr txBox="1"/>
+          <p:nvPr/>
+        </p:nvSpPr>
+        <p:spPr>
+          <a:xfrm>
+            <a:off x="609445" y="885132"/>
+            <a:ext cx="301686" cy="369332"/>
+          </a:xfrm>
+          <a:prstGeom prst="rect">
+            <a:avLst/>
+          </a:prstGeom>
+          <a:noFill/>
+        </p:spPr>
+        <p:txBody>
+          <a:bodyPr wrap="none" rtlCol="0">
+            <a:spAutoFit/>
+          </a:bodyPr>
+          <a:lstStyle/>
+          <a:p>
+            <a:r>
+              <a:rPr lang="en-US" dirty="0"/>
+              <a:t>1</a:t>
+            </a:r>
+          </a:p>
+        </p:txBody>
+      </p:sp>
+      <p:sp>
+        <p:nvSpPr>
+          <p:cNvPr id="23" name="TextBox 22">
+            <a:extLst>
+              <a:ext uri="{FF2B5EF4-FFF2-40B4-BE49-F238E27FC236}">
+                <a16:creationId xmlns:a16="http://schemas.microsoft.com/office/drawing/2014/main" id="{6417A94F-A7BD-DC45-9782-74CBF7700619}"/>
+              </a:ext>
+            </a:extLst>
+          </p:cNvPr>
+          <p:cNvSpPr txBox="1"/>
+          <p:nvPr/>
+        </p:nvSpPr>
+        <p:spPr>
+          <a:xfrm>
+            <a:off x="1790494" y="885132"/>
+            <a:ext cx="301686" cy="369332"/>
+          </a:xfrm>
+          <a:prstGeom prst="rect">
+            <a:avLst/>
+          </a:prstGeom>
+          <a:noFill/>
+        </p:spPr>
+        <p:txBody>
+          <a:bodyPr wrap="none" rtlCol="0">
+            <a:spAutoFit/>
+          </a:bodyPr>
+          <a:lstStyle/>
+          <a:p>
+            <a:r>
+              <a:rPr lang="en-US" dirty="0"/>
+              <a:t>2</a:t>
+            </a:r>
+          </a:p>
+        </p:txBody>
+      </p:sp>
+      <p:sp>
+        <p:nvSpPr>
+          <p:cNvPr id="24" name="TextBox 23">
+            <a:extLst>
+              <a:ext uri="{FF2B5EF4-FFF2-40B4-BE49-F238E27FC236}">
+                <a16:creationId xmlns:a16="http://schemas.microsoft.com/office/drawing/2014/main" id="{4D278314-7208-874C-9CD7-5941FA4564A8}"/>
+              </a:ext>
+            </a:extLst>
+          </p:cNvPr>
+          <p:cNvSpPr txBox="1"/>
+          <p:nvPr/>
+        </p:nvSpPr>
+        <p:spPr>
+          <a:xfrm>
+            <a:off x="2971543" y="885132"/>
+            <a:ext cx="301686" cy="369332"/>
+          </a:xfrm>
+          <a:prstGeom prst="rect">
+            <a:avLst/>
+          </a:prstGeom>
+          <a:noFill/>
+        </p:spPr>
+        <p:txBody>
+          <a:bodyPr wrap="none" rtlCol="0">
+            <a:spAutoFit/>
+          </a:bodyPr>
+          <a:lstStyle/>
+          <a:p>
+            <a:r>
+              <a:rPr lang="en-US" dirty="0"/>
+              <a:t>3</a:t>
+            </a:r>
+          </a:p>
+        </p:txBody>
+      </p:sp>
+      <p:sp>
+        <p:nvSpPr>
+          <p:cNvPr id="25" name="TextBox 24">
+            <a:extLst>
+              <a:ext uri="{FF2B5EF4-FFF2-40B4-BE49-F238E27FC236}">
+                <a16:creationId xmlns:a16="http://schemas.microsoft.com/office/drawing/2014/main" id="{0DF7B6ED-40B7-614A-944C-E37F67EAC535}"/>
+              </a:ext>
+            </a:extLst>
+          </p:cNvPr>
+          <p:cNvSpPr txBox="1"/>
+          <p:nvPr/>
+        </p:nvSpPr>
+        <p:spPr>
+          <a:xfrm>
+            <a:off x="4152592" y="885132"/>
+            <a:ext cx="301686" cy="369332"/>
+          </a:xfrm>
+          <a:prstGeom prst="rect">
+            <a:avLst/>
+          </a:prstGeom>
+          <a:noFill/>
+        </p:spPr>
+        <p:txBody>
+          <a:bodyPr wrap="none" rtlCol="0">
+            <a:spAutoFit/>
+          </a:bodyPr>
+          <a:lstStyle/>
+          <a:p>
+            <a:r>
+              <a:rPr lang="en-US" dirty="0"/>
+              <a:t>4</a:t>
+            </a:r>
+          </a:p>
+        </p:txBody>
+      </p:sp>
+      <p:sp>
+        <p:nvSpPr>
+          <p:cNvPr id="26" name="TextBox 25">
+            <a:extLst>
+              <a:ext uri="{FF2B5EF4-FFF2-40B4-BE49-F238E27FC236}">
+                <a16:creationId xmlns:a16="http://schemas.microsoft.com/office/drawing/2014/main" id="{E947FCDE-6AFC-A94F-8A49-BB3D138EEB40}"/>
+              </a:ext>
+            </a:extLst>
+          </p:cNvPr>
+          <p:cNvSpPr txBox="1"/>
+          <p:nvPr/>
+        </p:nvSpPr>
+        <p:spPr>
+          <a:xfrm>
+            <a:off x="5333641" y="885132"/>
+            <a:ext cx="301686" cy="369332"/>
+          </a:xfrm>
+          <a:prstGeom prst="rect">
+            <a:avLst/>
+          </a:prstGeom>
+          <a:noFill/>
+        </p:spPr>
+        <p:txBody>
+          <a:bodyPr wrap="none" rtlCol="0">
+            <a:spAutoFit/>
+          </a:bodyPr>
+          <a:lstStyle/>
+          <a:p>
+            <a:r>
+              <a:rPr lang="en-US" dirty="0"/>
+              <a:t>5</a:t>
+            </a:r>
+          </a:p>
+        </p:txBody>
+      </p:sp>
+      <p:sp>
+        <p:nvSpPr>
+          <p:cNvPr id="27" name="TextBox 26">
+            <a:extLst>
+              <a:ext uri="{FF2B5EF4-FFF2-40B4-BE49-F238E27FC236}">
+                <a16:creationId xmlns:a16="http://schemas.microsoft.com/office/drawing/2014/main" id="{9042BA63-5981-C741-B666-BD3BE58EE484}"/>
+              </a:ext>
+            </a:extLst>
+          </p:cNvPr>
+          <p:cNvSpPr txBox="1"/>
+          <p:nvPr/>
+        </p:nvSpPr>
+        <p:spPr>
+          <a:xfrm>
+            <a:off x="6514690" y="885132"/>
+            <a:ext cx="301686" cy="369332"/>
+          </a:xfrm>
+          <a:prstGeom prst="rect">
+            <a:avLst/>
+          </a:prstGeom>
+          <a:noFill/>
+        </p:spPr>
+        <p:txBody>
+          <a:bodyPr wrap="none" rtlCol="0">
+            <a:spAutoFit/>
+          </a:bodyPr>
+          <a:lstStyle/>
+          <a:p>
+            <a:r>
+              <a:rPr lang="en-US" dirty="0"/>
+              <a:t>6</a:t>
+            </a:r>
+          </a:p>
+        </p:txBody>
+      </p:sp>
+      <p:sp>
+        <p:nvSpPr>
+          <p:cNvPr id="28" name="TextBox 27">
+            <a:extLst>
+              <a:ext uri="{FF2B5EF4-FFF2-40B4-BE49-F238E27FC236}">
+                <a16:creationId xmlns:a16="http://schemas.microsoft.com/office/drawing/2014/main" id="{3AD314DB-0F67-D64A-85E1-6E2C60E166D0}"/>
+              </a:ext>
+            </a:extLst>
+          </p:cNvPr>
+          <p:cNvSpPr txBox="1"/>
+          <p:nvPr/>
+        </p:nvSpPr>
+        <p:spPr>
+          <a:xfrm>
+            <a:off x="7695739" y="885132"/>
+            <a:ext cx="301686" cy="369332"/>
+          </a:xfrm>
+          <a:prstGeom prst="rect">
+            <a:avLst/>
+          </a:prstGeom>
+          <a:noFill/>
+        </p:spPr>
+        <p:txBody>
+          <a:bodyPr wrap="none" rtlCol="0">
+            <a:spAutoFit/>
+          </a:bodyPr>
+          <a:lstStyle/>
+          <a:p>
+            <a:r>
+              <a:rPr lang="en-US" dirty="0"/>
+              <a:t>7</a:t>
+            </a:r>
+          </a:p>
+        </p:txBody>
+      </p:sp>
+      <p:sp>
+        <p:nvSpPr>
+          <p:cNvPr id="29" name="TextBox 28">
+            <a:extLst>
+              <a:ext uri="{FF2B5EF4-FFF2-40B4-BE49-F238E27FC236}">
+                <a16:creationId xmlns:a16="http://schemas.microsoft.com/office/drawing/2014/main" id="{0111417A-5108-8843-954C-89CDC74D0811}"/>
+              </a:ext>
+            </a:extLst>
+          </p:cNvPr>
+          <p:cNvSpPr txBox="1"/>
+          <p:nvPr/>
+        </p:nvSpPr>
+        <p:spPr>
+          <a:xfrm>
+            <a:off x="8876788" y="885132"/>
+            <a:ext cx="301686" cy="369332"/>
+          </a:xfrm>
+          <a:prstGeom prst="rect">
+            <a:avLst/>
+          </a:prstGeom>
+          <a:noFill/>
+        </p:spPr>
+        <p:txBody>
+          <a:bodyPr wrap="none" rtlCol="0">
+            <a:spAutoFit/>
+          </a:bodyPr>
+          <a:lstStyle/>
+          <a:p>
+            <a:r>
+              <a:rPr lang="en-US" dirty="0"/>
+              <a:t>8</a:t>
+            </a:r>
+          </a:p>
+        </p:txBody>
+      </p:sp>
+      <p:sp>
+        <p:nvSpPr>
+          <p:cNvPr id="30" name="TextBox 29">
+            <a:extLst>
+              <a:ext uri="{FF2B5EF4-FFF2-40B4-BE49-F238E27FC236}">
+                <a16:creationId xmlns:a16="http://schemas.microsoft.com/office/drawing/2014/main" id="{80CDAC39-6A45-554C-8AA3-7B840A91598F}"/>
+              </a:ext>
+            </a:extLst>
+          </p:cNvPr>
+          <p:cNvSpPr txBox="1"/>
+          <p:nvPr/>
+        </p:nvSpPr>
+        <p:spPr>
+          <a:xfrm>
+            <a:off x="10057837" y="885132"/>
+            <a:ext cx="301686" cy="369332"/>
+          </a:xfrm>
+          <a:prstGeom prst="rect">
+            <a:avLst/>
+          </a:prstGeom>
+          <a:noFill/>
+        </p:spPr>
+        <p:txBody>
+          <a:bodyPr wrap="none" rtlCol="0">
+            <a:spAutoFit/>
+          </a:bodyPr>
+          <a:lstStyle/>
+          <a:p>
+            <a:r>
+              <a:rPr lang="en-US" dirty="0"/>
+              <a:t>9</a:t>
+            </a:r>
+          </a:p>
+        </p:txBody>
+      </p:sp>
+      <p:sp>
+        <p:nvSpPr>
+          <p:cNvPr id="31" name="TextBox 30">
+            <a:extLst>
+              <a:ext uri="{FF2B5EF4-FFF2-40B4-BE49-F238E27FC236}">
+                <a16:creationId xmlns:a16="http://schemas.microsoft.com/office/drawing/2014/main" id="{F5496CDF-E31D-4849-935B-3B89591662E3}"/>
+              </a:ext>
+            </a:extLst>
+          </p:cNvPr>
+          <p:cNvSpPr txBox="1"/>
+          <p:nvPr/>
+        </p:nvSpPr>
+        <p:spPr>
+          <a:xfrm>
+            <a:off x="11238883" y="885132"/>
+            <a:ext cx="418704" cy="369332"/>
+          </a:xfrm>
+          <a:prstGeom prst="rect">
+            <a:avLst/>
+          </a:prstGeom>
+          <a:noFill/>
+        </p:spPr>
+        <p:txBody>
+          <a:bodyPr wrap="none" rtlCol="0">
+            <a:spAutoFit/>
+          </a:bodyPr>
+          <a:lstStyle/>
+          <a:p>
+            <a:r>
+              <a:rPr lang="en-US" dirty="0"/>
+              <a:t>10</a:t>
+            </a:r>
+          </a:p>
+        </p:txBody>
+      </p:sp>
+      <p:sp>
+        <p:nvSpPr>
+          <p:cNvPr id="32" name="TextBox 31">
+            <a:extLst>
+              <a:ext uri="{FF2B5EF4-FFF2-40B4-BE49-F238E27FC236}">
+                <a16:creationId xmlns:a16="http://schemas.microsoft.com/office/drawing/2014/main" id="{CAFBD04D-7EC9-2A4A-BF31-49E2FBAFABF5}"/>
+              </a:ext>
+            </a:extLst>
+          </p:cNvPr>
+          <p:cNvSpPr txBox="1"/>
+          <p:nvPr/>
+        </p:nvSpPr>
+        <p:spPr>
+          <a:xfrm>
+            <a:off x="278870" y="2030107"/>
+            <a:ext cx="829073" cy="923330"/>
+          </a:xfrm>
+          <a:prstGeom prst="rect">
+            <a:avLst/>
+          </a:prstGeom>
+          <a:noFill/>
+        </p:spPr>
+        <p:txBody>
+          <a:bodyPr wrap="none" rtlCol="0">
+            <a:spAutoFit/>
+          </a:bodyPr>
+          <a:lstStyle/>
+          <a:p>
+            <a:r>
+              <a:rPr lang="en-US" dirty="0"/>
+              <a:t>1)</a:t>
+            </a:r>
+          </a:p>
+          <a:p>
+            <a:r>
+              <a:rPr lang="en-US" dirty="0"/>
+              <a:t>0.05Hz</a:t>
+            </a:r>
+          </a:p>
+          <a:p>
+            <a:r>
+              <a:rPr lang="en-US" dirty="0"/>
+              <a:t>0</a:t>
+            </a:r>
+            <a:r>
+              <a:rPr lang="en-US" baseline="30000" dirty="0"/>
+              <a:t>o</a:t>
+            </a:r>
+            <a:endParaRPr lang="en-US" dirty="0"/>
+          </a:p>
+        </p:txBody>
+      </p:sp>
+      <p:sp>
+        <p:nvSpPr>
+          <p:cNvPr id="33" name="TextBox 32">
+            <a:extLst>
+              <a:ext uri="{FF2B5EF4-FFF2-40B4-BE49-F238E27FC236}">
+                <a16:creationId xmlns:a16="http://schemas.microsoft.com/office/drawing/2014/main" id="{991D7F33-0802-3E44-896B-954849ED37B6}"/>
+              </a:ext>
+            </a:extLst>
+          </p:cNvPr>
+          <p:cNvSpPr txBox="1"/>
+          <p:nvPr/>
+        </p:nvSpPr>
+        <p:spPr>
+          <a:xfrm>
+            <a:off x="489424" y="4713807"/>
+            <a:ext cx="881973" cy="923330"/>
+          </a:xfrm>
+          <a:prstGeom prst="rect">
+            <a:avLst/>
+          </a:prstGeom>
+          <a:noFill/>
+        </p:spPr>
+        <p:txBody>
+          <a:bodyPr wrap="none" rtlCol="0">
+            <a:spAutoFit/>
+          </a:bodyPr>
+          <a:lstStyle/>
+          <a:p>
+            <a:r>
+              <a:rPr lang="en-US" dirty="0"/>
+              <a:t>2)</a:t>
+            </a:r>
+          </a:p>
+          <a:p>
+            <a:r>
+              <a:rPr lang="en-US" dirty="0"/>
+              <a:t>0.04 Hz</a:t>
+            </a:r>
+          </a:p>
+          <a:p>
+            <a:r>
+              <a:rPr lang="en-US" dirty="0"/>
+              <a:t>60</a:t>
+            </a:r>
+            <a:r>
+              <a:rPr lang="en-US" baseline="30000" dirty="0"/>
+              <a:t>o</a:t>
+            </a:r>
+            <a:endParaRPr lang="en-US" dirty="0"/>
+          </a:p>
+        </p:txBody>
+      </p:sp>
+      <p:sp>
+        <p:nvSpPr>
+          <p:cNvPr id="34" name="TextBox 33">
+            <a:extLst>
+              <a:ext uri="{FF2B5EF4-FFF2-40B4-BE49-F238E27FC236}">
+                <a16:creationId xmlns:a16="http://schemas.microsoft.com/office/drawing/2014/main" id="{55C6303D-84E5-0040-97CB-0E67E0FDC2DE}"/>
+              </a:ext>
+            </a:extLst>
+          </p:cNvPr>
+          <p:cNvSpPr txBox="1"/>
+          <p:nvPr/>
+        </p:nvSpPr>
+        <p:spPr>
+          <a:xfrm>
+            <a:off x="1298558" y="2736891"/>
+            <a:ext cx="1151277" cy="738664"/>
+          </a:xfrm>
+          <a:prstGeom prst="rect">
+            <a:avLst/>
+          </a:prstGeom>
+          <a:noFill/>
+        </p:spPr>
+        <p:txBody>
+          <a:bodyPr wrap="none" rtlCol="0">
+            <a:spAutoFit/>
+          </a:bodyPr>
+          <a:lstStyle/>
+          <a:p>
+            <a:r>
+              <a:rPr lang="en-US" sz="1400" dirty="0"/>
+              <a:t>1)</a:t>
+            </a:r>
+          </a:p>
+          <a:p>
+            <a:r>
+              <a:rPr lang="en-US" sz="1400" dirty="0"/>
+              <a:t>+0.01Hz+90</a:t>
+            </a:r>
+            <a:r>
+              <a:rPr lang="en-US" sz="1400" baseline="30000" dirty="0"/>
+              <a:t>o</a:t>
+            </a:r>
+            <a:r>
+              <a:rPr lang="en-US" sz="1400" dirty="0"/>
+              <a:t> </a:t>
+            </a:r>
+          </a:p>
+          <a:p>
+            <a:r>
+              <a:rPr lang="en-US" sz="1400" dirty="0"/>
+              <a:t>0.06Hz</a:t>
+            </a:r>
+          </a:p>
+        </p:txBody>
+      </p:sp>
+      <p:sp>
+        <p:nvSpPr>
+          <p:cNvPr id="35" name="TextBox 34">
+            <a:extLst>
+              <a:ext uri="{FF2B5EF4-FFF2-40B4-BE49-F238E27FC236}">
+                <a16:creationId xmlns:a16="http://schemas.microsoft.com/office/drawing/2014/main" id="{62044267-B35D-7447-B35B-591283D63A05}"/>
+              </a:ext>
+            </a:extLst>
+          </p:cNvPr>
+          <p:cNvSpPr txBox="1"/>
+          <p:nvPr/>
+        </p:nvSpPr>
+        <p:spPr>
+          <a:xfrm>
+            <a:off x="1686737" y="4188700"/>
+            <a:ext cx="301686" cy="369332"/>
+          </a:xfrm>
+          <a:prstGeom prst="rect">
+            <a:avLst/>
+          </a:prstGeom>
+          <a:noFill/>
+        </p:spPr>
+        <p:txBody>
+          <a:bodyPr wrap="none" rtlCol="0">
+            <a:spAutoFit/>
+          </a:bodyPr>
+          <a:lstStyle/>
+          <a:p>
+            <a:r>
+              <a:rPr lang="en-US" dirty="0"/>
+              <a:t>2</a:t>
+            </a:r>
+          </a:p>
+        </p:txBody>
+      </p:sp>
+      <p:sp>
+        <p:nvSpPr>
+          <p:cNvPr id="36" name="TextBox 35">
+            <a:extLst>
+              <a:ext uri="{FF2B5EF4-FFF2-40B4-BE49-F238E27FC236}">
+                <a16:creationId xmlns:a16="http://schemas.microsoft.com/office/drawing/2014/main" id="{3986BF8C-F957-D547-A4BC-386A00A332F7}"/>
+              </a:ext>
+            </a:extLst>
+          </p:cNvPr>
+          <p:cNvSpPr txBox="1"/>
+          <p:nvPr/>
+        </p:nvSpPr>
+        <p:spPr>
+          <a:xfrm>
+            <a:off x="2703995" y="1348411"/>
+            <a:ext cx="686406" cy="523220"/>
+          </a:xfrm>
+          <a:prstGeom prst="rect">
+            <a:avLst/>
+          </a:prstGeom>
+          <a:noFill/>
+        </p:spPr>
+        <p:txBody>
+          <a:bodyPr wrap="none" rtlCol="0">
+            <a:spAutoFit/>
+          </a:bodyPr>
+          <a:lstStyle/>
+          <a:p>
+            <a:r>
+              <a:rPr lang="en-US" sz="1400" dirty="0"/>
+              <a:t>1)</a:t>
+            </a:r>
+          </a:p>
+          <a:p>
+            <a:r>
+              <a:rPr lang="en-US" sz="1400" dirty="0"/>
+              <a:t>0.05Hz</a:t>
+            </a:r>
+          </a:p>
+        </p:txBody>
+      </p:sp>
+      <p:sp>
+        <p:nvSpPr>
+          <p:cNvPr id="37" name="TextBox 36">
+            <a:extLst>
+              <a:ext uri="{FF2B5EF4-FFF2-40B4-BE49-F238E27FC236}">
+                <a16:creationId xmlns:a16="http://schemas.microsoft.com/office/drawing/2014/main" id="{2DBE71B7-BB1E-A344-A5D4-B18DEEB9F1A4}"/>
+              </a:ext>
+            </a:extLst>
+          </p:cNvPr>
+          <p:cNvSpPr txBox="1"/>
+          <p:nvPr/>
+        </p:nvSpPr>
+        <p:spPr>
+          <a:xfrm>
+            <a:off x="2914066" y="3885343"/>
+            <a:ext cx="301686" cy="369332"/>
+          </a:xfrm>
+          <a:prstGeom prst="rect">
+            <a:avLst/>
+          </a:prstGeom>
+          <a:noFill/>
+        </p:spPr>
+        <p:txBody>
+          <a:bodyPr wrap="none" rtlCol="0">
+            <a:spAutoFit/>
+          </a:bodyPr>
+          <a:lstStyle/>
+          <a:p>
+            <a:r>
+              <a:rPr lang="en-US" dirty="0"/>
+              <a:t>2</a:t>
+            </a:r>
+          </a:p>
+        </p:txBody>
+      </p:sp>
+      <p:sp>
+        <p:nvSpPr>
+          <p:cNvPr id="38" name="TextBox 37">
+            <a:extLst>
+              <a:ext uri="{FF2B5EF4-FFF2-40B4-BE49-F238E27FC236}">
+                <a16:creationId xmlns:a16="http://schemas.microsoft.com/office/drawing/2014/main" id="{42BEAC36-8AC9-2F4C-839D-B32142CDBD24}"/>
+              </a:ext>
+            </a:extLst>
+          </p:cNvPr>
+          <p:cNvSpPr txBox="1"/>
+          <p:nvPr/>
+        </p:nvSpPr>
+        <p:spPr>
+          <a:xfrm>
+            <a:off x="4079767" y="3925902"/>
+            <a:ext cx="301686" cy="369332"/>
+          </a:xfrm>
+          <a:prstGeom prst="rect">
+            <a:avLst/>
+          </a:prstGeom>
+          <a:noFill/>
+        </p:spPr>
+        <p:txBody>
+          <a:bodyPr wrap="none" rtlCol="0">
+            <a:spAutoFit/>
+          </a:bodyPr>
+          <a:lstStyle/>
+          <a:p>
+            <a:r>
+              <a:rPr lang="en-US" dirty="0"/>
+              <a:t>2</a:t>
+            </a:r>
+          </a:p>
+        </p:txBody>
+      </p:sp>
+      <p:sp>
+        <p:nvSpPr>
+          <p:cNvPr id="39" name="TextBox 38">
+            <a:extLst>
+              <a:ext uri="{FF2B5EF4-FFF2-40B4-BE49-F238E27FC236}">
+                <a16:creationId xmlns:a16="http://schemas.microsoft.com/office/drawing/2014/main" id="{676DB6B3-E673-7549-8975-61FC7D7685D9}"/>
+              </a:ext>
+            </a:extLst>
+          </p:cNvPr>
+          <p:cNvSpPr txBox="1"/>
+          <p:nvPr/>
+        </p:nvSpPr>
+        <p:spPr>
+          <a:xfrm>
+            <a:off x="5296365" y="3905353"/>
+            <a:ext cx="301686" cy="369332"/>
+          </a:xfrm>
+          <a:prstGeom prst="rect">
+            <a:avLst/>
+          </a:prstGeom>
+          <a:noFill/>
+        </p:spPr>
+        <p:txBody>
+          <a:bodyPr wrap="none" rtlCol="0">
+            <a:spAutoFit/>
+          </a:bodyPr>
+          <a:lstStyle/>
+          <a:p>
+            <a:r>
+              <a:rPr lang="en-US" dirty="0"/>
+              <a:t>2</a:t>
+            </a:r>
+          </a:p>
+        </p:txBody>
+      </p:sp>
+      <p:sp>
+        <p:nvSpPr>
+          <p:cNvPr id="40" name="TextBox 39">
+            <a:extLst>
+              <a:ext uri="{FF2B5EF4-FFF2-40B4-BE49-F238E27FC236}">
+                <a16:creationId xmlns:a16="http://schemas.microsoft.com/office/drawing/2014/main" id="{C345C152-9C52-8246-B43B-BD7BE2377A60}"/>
+              </a:ext>
+            </a:extLst>
+          </p:cNvPr>
+          <p:cNvSpPr txBox="1"/>
+          <p:nvPr/>
+        </p:nvSpPr>
+        <p:spPr>
+          <a:xfrm>
+            <a:off x="6463203" y="4123876"/>
+            <a:ext cx="301686" cy="369332"/>
+          </a:xfrm>
+          <a:prstGeom prst="rect">
+            <a:avLst/>
+          </a:prstGeom>
+          <a:noFill/>
+        </p:spPr>
+        <p:txBody>
+          <a:bodyPr wrap="none" rtlCol="0">
+            <a:spAutoFit/>
+          </a:bodyPr>
+          <a:lstStyle/>
+          <a:p>
+            <a:r>
+              <a:rPr lang="en-US" dirty="0"/>
+              <a:t>2</a:t>
+            </a:r>
+          </a:p>
+        </p:txBody>
+      </p:sp>
+      <p:sp>
+        <p:nvSpPr>
+          <p:cNvPr id="41" name="TextBox 40">
+            <a:extLst>
+              <a:ext uri="{FF2B5EF4-FFF2-40B4-BE49-F238E27FC236}">
+                <a16:creationId xmlns:a16="http://schemas.microsoft.com/office/drawing/2014/main" id="{BC2534B6-9A9B-0F4A-9480-0D8AE99969E9}"/>
+              </a:ext>
+            </a:extLst>
+          </p:cNvPr>
+          <p:cNvSpPr txBox="1"/>
+          <p:nvPr/>
+        </p:nvSpPr>
+        <p:spPr>
+          <a:xfrm>
+            <a:off x="7642142" y="4132595"/>
+            <a:ext cx="301686" cy="369332"/>
+          </a:xfrm>
+          <a:prstGeom prst="rect">
+            <a:avLst/>
+          </a:prstGeom>
+          <a:noFill/>
+        </p:spPr>
+        <p:txBody>
+          <a:bodyPr wrap="none" rtlCol="0">
+            <a:spAutoFit/>
+          </a:bodyPr>
+          <a:lstStyle/>
+          <a:p>
+            <a:r>
+              <a:rPr lang="en-US" dirty="0"/>
+              <a:t>2</a:t>
+            </a:r>
+          </a:p>
+        </p:txBody>
+      </p:sp>
+      <p:sp>
+        <p:nvSpPr>
+          <p:cNvPr id="42" name="TextBox 41">
+            <a:extLst>
+              <a:ext uri="{FF2B5EF4-FFF2-40B4-BE49-F238E27FC236}">
+                <a16:creationId xmlns:a16="http://schemas.microsoft.com/office/drawing/2014/main" id="{3E651113-6268-784D-A6A4-29C57E4DD185}"/>
+              </a:ext>
+            </a:extLst>
+          </p:cNvPr>
+          <p:cNvSpPr txBox="1"/>
+          <p:nvPr/>
+        </p:nvSpPr>
+        <p:spPr>
+          <a:xfrm>
+            <a:off x="8880440" y="4755491"/>
+            <a:ext cx="425116" cy="369332"/>
+          </a:xfrm>
+          <a:prstGeom prst="rect">
+            <a:avLst/>
+          </a:prstGeom>
+          <a:noFill/>
+        </p:spPr>
+        <p:txBody>
+          <a:bodyPr wrap="none" rtlCol="0">
+            <a:spAutoFit/>
+          </a:bodyPr>
+          <a:lstStyle/>
+          <a:p>
+            <a:r>
+              <a:rPr lang="en-US" dirty="0"/>
+              <a:t>2 )</a:t>
+            </a:r>
+          </a:p>
+        </p:txBody>
+      </p:sp>
+      <p:sp>
+        <p:nvSpPr>
+          <p:cNvPr id="43" name="TextBox 42">
+            <a:extLst>
+              <a:ext uri="{FF2B5EF4-FFF2-40B4-BE49-F238E27FC236}">
+                <a16:creationId xmlns:a16="http://schemas.microsoft.com/office/drawing/2014/main" id="{E58B663F-1601-284B-ADB1-19DF7E06B517}"/>
+              </a:ext>
+            </a:extLst>
+          </p:cNvPr>
+          <p:cNvSpPr txBox="1"/>
+          <p:nvPr/>
+        </p:nvSpPr>
+        <p:spPr>
+          <a:xfrm>
+            <a:off x="10025433" y="4776040"/>
+            <a:ext cx="425116" cy="369332"/>
+          </a:xfrm>
+          <a:prstGeom prst="rect">
+            <a:avLst/>
+          </a:prstGeom>
+          <a:noFill/>
+        </p:spPr>
+        <p:txBody>
+          <a:bodyPr wrap="none" rtlCol="0">
+            <a:spAutoFit/>
+          </a:bodyPr>
+          <a:lstStyle/>
+          <a:p>
+            <a:r>
+              <a:rPr lang="en-US" dirty="0"/>
+              <a:t>2 )</a:t>
+            </a:r>
+          </a:p>
+        </p:txBody>
+      </p:sp>
+      <p:sp>
+        <p:nvSpPr>
+          <p:cNvPr id="44" name="TextBox 43">
+            <a:extLst>
+              <a:ext uri="{FF2B5EF4-FFF2-40B4-BE49-F238E27FC236}">
+                <a16:creationId xmlns:a16="http://schemas.microsoft.com/office/drawing/2014/main" id="{EBA538F7-0FFB-9F47-90E7-2E7DBBA9A460}"/>
+              </a:ext>
+            </a:extLst>
+          </p:cNvPr>
+          <p:cNvSpPr txBox="1"/>
+          <p:nvPr/>
+        </p:nvSpPr>
+        <p:spPr>
+          <a:xfrm>
+            <a:off x="11156981" y="4825648"/>
+            <a:ext cx="425116" cy="369332"/>
+          </a:xfrm>
+          <a:prstGeom prst="rect">
+            <a:avLst/>
+          </a:prstGeom>
+          <a:noFill/>
+        </p:spPr>
+        <p:txBody>
+          <a:bodyPr wrap="none" rtlCol="0">
+            <a:spAutoFit/>
+          </a:bodyPr>
+          <a:lstStyle/>
+          <a:p>
+            <a:r>
+              <a:rPr lang="en-US" dirty="0"/>
+              <a:t>2 )</a:t>
+            </a:r>
+          </a:p>
+        </p:txBody>
+      </p:sp>
+      <p:sp>
+        <p:nvSpPr>
+          <p:cNvPr id="45" name="TextBox 44">
+            <a:extLst>
+              <a:ext uri="{FF2B5EF4-FFF2-40B4-BE49-F238E27FC236}">
+                <a16:creationId xmlns:a16="http://schemas.microsoft.com/office/drawing/2014/main" id="{7CF7BCFA-BD35-874A-8D1B-EA65BB51B909}"/>
+              </a:ext>
+            </a:extLst>
+          </p:cNvPr>
+          <p:cNvSpPr txBox="1"/>
+          <p:nvPr/>
+        </p:nvSpPr>
+        <p:spPr>
+          <a:xfrm>
+            <a:off x="6141468" y="2827806"/>
+            <a:ext cx="1151277" cy="523220"/>
+          </a:xfrm>
+          <a:prstGeom prst="rect">
+            <a:avLst/>
+          </a:prstGeom>
+          <a:noFill/>
+        </p:spPr>
+        <p:txBody>
+          <a:bodyPr wrap="none" rtlCol="0">
+            <a:spAutoFit/>
+          </a:bodyPr>
+          <a:lstStyle/>
+          <a:p>
+            <a:r>
+              <a:rPr lang="en-US" sz="1400" dirty="0"/>
+              <a:t>1)</a:t>
+            </a:r>
+          </a:p>
+          <a:p>
+            <a:r>
+              <a:rPr lang="en-US" sz="1400" dirty="0"/>
+              <a:t>+0.01Hz+90</a:t>
+            </a:r>
+            <a:r>
+              <a:rPr lang="en-US" sz="1400" baseline="30000" dirty="0"/>
+              <a:t>o</a:t>
+            </a:r>
+            <a:r>
+              <a:rPr lang="en-US" sz="1400" dirty="0"/>
+              <a:t> </a:t>
+            </a:r>
+          </a:p>
+        </p:txBody>
+      </p:sp>
+      <p:sp>
+        <p:nvSpPr>
+          <p:cNvPr id="46" name="TextBox 45">
+            <a:extLst>
+              <a:ext uri="{FF2B5EF4-FFF2-40B4-BE49-F238E27FC236}">
+                <a16:creationId xmlns:a16="http://schemas.microsoft.com/office/drawing/2014/main" id="{C1BED49B-723E-7E4D-B169-8AD4B1E7A81B}"/>
+              </a:ext>
+            </a:extLst>
+          </p:cNvPr>
+          <p:cNvSpPr txBox="1"/>
+          <p:nvPr/>
+        </p:nvSpPr>
+        <p:spPr>
+          <a:xfrm>
+            <a:off x="7368189" y="2890812"/>
+            <a:ext cx="1151277" cy="523220"/>
+          </a:xfrm>
+          <a:prstGeom prst="rect">
+            <a:avLst/>
+          </a:prstGeom>
+          <a:noFill/>
+        </p:spPr>
+        <p:txBody>
+          <a:bodyPr wrap="none" rtlCol="0">
+            <a:spAutoFit/>
+          </a:bodyPr>
+          <a:lstStyle/>
+          <a:p>
+            <a:r>
+              <a:rPr lang="en-US" sz="1400" dirty="0"/>
+              <a:t>1)</a:t>
+            </a:r>
+          </a:p>
+          <a:p>
+            <a:r>
+              <a:rPr lang="en-US" sz="1400" dirty="0"/>
+              <a:t>+0.01Hz+90</a:t>
+            </a:r>
+            <a:r>
+              <a:rPr lang="en-US" sz="1400" baseline="30000" dirty="0"/>
+              <a:t>o</a:t>
+            </a:r>
+            <a:r>
+              <a:rPr lang="en-US" sz="1400" dirty="0"/>
+              <a:t> </a:t>
+            </a:r>
+          </a:p>
+        </p:txBody>
+      </p:sp>
+      <p:sp>
+        <p:nvSpPr>
+          <p:cNvPr id="47" name="TextBox 46">
+            <a:extLst>
+              <a:ext uri="{FF2B5EF4-FFF2-40B4-BE49-F238E27FC236}">
+                <a16:creationId xmlns:a16="http://schemas.microsoft.com/office/drawing/2014/main" id="{CA56ECB4-1800-F747-A95C-27677CCF4774}"/>
+              </a:ext>
+            </a:extLst>
+          </p:cNvPr>
+          <p:cNvSpPr txBox="1"/>
+          <p:nvPr/>
+        </p:nvSpPr>
+        <p:spPr>
+          <a:xfrm>
+            <a:off x="1398140" y="5281615"/>
+            <a:ext cx="1207382" cy="738664"/>
+          </a:xfrm>
+          <a:prstGeom prst="rect">
+            <a:avLst/>
+          </a:prstGeom>
+          <a:noFill/>
+        </p:spPr>
+        <p:txBody>
+          <a:bodyPr wrap="none" rtlCol="0">
+            <a:spAutoFit/>
+          </a:bodyPr>
+          <a:lstStyle/>
+          <a:p>
+            <a:r>
+              <a:rPr lang="en-US" sz="1400" dirty="0"/>
+              <a:t>2)</a:t>
+            </a:r>
+          </a:p>
+          <a:p>
+            <a:r>
+              <a:rPr lang="en-US" sz="1400" dirty="0"/>
+              <a:t>-0.005Hz+90</a:t>
+            </a:r>
+            <a:r>
+              <a:rPr lang="en-US" sz="1400" baseline="30000" dirty="0"/>
+              <a:t>o</a:t>
+            </a:r>
+            <a:r>
+              <a:rPr lang="en-US" sz="1400" dirty="0"/>
+              <a:t> </a:t>
+            </a:r>
+          </a:p>
+          <a:p>
+            <a:r>
+              <a:rPr lang="en-US" sz="1400" dirty="0"/>
+              <a:t>0.035Hz</a:t>
+            </a:r>
+          </a:p>
+        </p:txBody>
+      </p:sp>
+      <p:sp>
+        <p:nvSpPr>
+          <p:cNvPr id="48" name="TextBox 47">
+            <a:extLst>
+              <a:ext uri="{FF2B5EF4-FFF2-40B4-BE49-F238E27FC236}">
+                <a16:creationId xmlns:a16="http://schemas.microsoft.com/office/drawing/2014/main" id="{C3229777-EBBC-7C43-B8BB-B13C73C52ED9}"/>
+              </a:ext>
+            </a:extLst>
+          </p:cNvPr>
+          <p:cNvSpPr txBox="1"/>
+          <p:nvPr/>
+        </p:nvSpPr>
+        <p:spPr>
+          <a:xfrm>
+            <a:off x="2489270" y="2530283"/>
+            <a:ext cx="1151277" cy="738664"/>
+          </a:xfrm>
+          <a:prstGeom prst="rect">
+            <a:avLst/>
+          </a:prstGeom>
+          <a:noFill/>
+        </p:spPr>
+        <p:txBody>
+          <a:bodyPr wrap="none" rtlCol="0">
+            <a:spAutoFit/>
+          </a:bodyPr>
+          <a:lstStyle/>
+          <a:p>
+            <a:r>
+              <a:rPr lang="en-US" sz="1400" dirty="0"/>
+              <a:t>1)</a:t>
+            </a:r>
+          </a:p>
+          <a:p>
+            <a:r>
+              <a:rPr lang="en-US" sz="1400" dirty="0"/>
+              <a:t>+0.01Hz+90</a:t>
+            </a:r>
+            <a:r>
+              <a:rPr lang="en-US" sz="1400" baseline="30000" dirty="0"/>
+              <a:t>o</a:t>
+            </a:r>
+            <a:r>
+              <a:rPr lang="en-US" sz="1400" dirty="0"/>
+              <a:t> </a:t>
+            </a:r>
+          </a:p>
+          <a:p>
+            <a:r>
+              <a:rPr lang="en-US" sz="1400" dirty="0"/>
+              <a:t>0.06Hz</a:t>
+            </a:r>
+          </a:p>
+        </p:txBody>
+      </p:sp>
+      <p:sp>
+        <p:nvSpPr>
+          <p:cNvPr id="49" name="TextBox 48">
+            <a:extLst>
+              <a:ext uri="{FF2B5EF4-FFF2-40B4-BE49-F238E27FC236}">
+                <a16:creationId xmlns:a16="http://schemas.microsoft.com/office/drawing/2014/main" id="{398844CA-41D1-734C-AD04-BCBBCF4611F3}"/>
+              </a:ext>
+            </a:extLst>
+          </p:cNvPr>
+          <p:cNvSpPr txBox="1"/>
+          <p:nvPr/>
+        </p:nvSpPr>
+        <p:spPr>
+          <a:xfrm>
+            <a:off x="2536940" y="1794178"/>
+            <a:ext cx="1242648" cy="738664"/>
+          </a:xfrm>
+          <a:prstGeom prst="rect">
+            <a:avLst/>
+          </a:prstGeom>
+          <a:noFill/>
+        </p:spPr>
+        <p:txBody>
+          <a:bodyPr wrap="none" rtlCol="0">
+            <a:spAutoFit/>
+          </a:bodyPr>
+          <a:lstStyle/>
+          <a:p>
+            <a:r>
+              <a:rPr lang="en-US" sz="1400" dirty="0"/>
+              <a:t>1)</a:t>
+            </a:r>
+          </a:p>
+          <a:p>
+            <a:r>
+              <a:rPr lang="en-US" sz="1400" dirty="0"/>
+              <a:t>+0.015Hz+45</a:t>
+            </a:r>
+            <a:r>
+              <a:rPr lang="en-US" sz="1400" baseline="30000" dirty="0"/>
+              <a:t>o</a:t>
+            </a:r>
+            <a:r>
+              <a:rPr lang="en-US" sz="1400" dirty="0"/>
+              <a:t> </a:t>
+            </a:r>
+          </a:p>
+          <a:p>
+            <a:r>
+              <a:rPr lang="en-US" sz="1400" dirty="0"/>
+              <a:t>0.065Hz</a:t>
+            </a:r>
+          </a:p>
+        </p:txBody>
+      </p:sp>
+      <p:sp>
+        <p:nvSpPr>
+          <p:cNvPr id="50" name="TextBox 49">
+            <a:extLst>
+              <a:ext uri="{FF2B5EF4-FFF2-40B4-BE49-F238E27FC236}">
+                <a16:creationId xmlns:a16="http://schemas.microsoft.com/office/drawing/2014/main" id="{C0CF26F2-F891-384E-9FC2-F9431D52DCBA}"/>
+              </a:ext>
+            </a:extLst>
+          </p:cNvPr>
+          <p:cNvSpPr txBox="1"/>
+          <p:nvPr/>
+        </p:nvSpPr>
+        <p:spPr>
+          <a:xfrm>
+            <a:off x="2477571" y="3117015"/>
+            <a:ext cx="1242648" cy="738664"/>
+          </a:xfrm>
+          <a:prstGeom prst="rect">
+            <a:avLst/>
+          </a:prstGeom>
+          <a:noFill/>
+        </p:spPr>
+        <p:txBody>
+          <a:bodyPr wrap="none" rtlCol="0">
+            <a:spAutoFit/>
+          </a:bodyPr>
+          <a:lstStyle/>
+          <a:p>
+            <a:r>
+              <a:rPr lang="en-US" sz="1400" dirty="0"/>
+              <a:t>1)</a:t>
+            </a:r>
+          </a:p>
+          <a:p>
+            <a:r>
+              <a:rPr lang="en-US" sz="1400" dirty="0"/>
+              <a:t>+0.005Hz+45</a:t>
+            </a:r>
+            <a:r>
+              <a:rPr lang="en-US" sz="1400" baseline="30000" dirty="0"/>
+              <a:t>o</a:t>
+            </a:r>
+            <a:r>
+              <a:rPr lang="en-US" sz="1400" dirty="0"/>
+              <a:t> </a:t>
+            </a:r>
+          </a:p>
+          <a:p>
+            <a:r>
+              <a:rPr lang="en-US" sz="1400" dirty="0"/>
+              <a:t>0.055Hz</a:t>
+            </a:r>
+          </a:p>
+        </p:txBody>
+      </p:sp>
+      <p:sp>
+        <p:nvSpPr>
+          <p:cNvPr id="51" name="TextBox 50">
+            <a:extLst>
+              <a:ext uri="{FF2B5EF4-FFF2-40B4-BE49-F238E27FC236}">
+                <a16:creationId xmlns:a16="http://schemas.microsoft.com/office/drawing/2014/main" id="{7E07B5DA-D311-2247-9F14-27C104063448}"/>
+              </a:ext>
+            </a:extLst>
+          </p:cNvPr>
+          <p:cNvSpPr txBox="1"/>
+          <p:nvPr/>
+        </p:nvSpPr>
+        <p:spPr>
+          <a:xfrm>
+            <a:off x="3754393" y="2495665"/>
+            <a:ext cx="1151277" cy="738664"/>
+          </a:xfrm>
+          <a:prstGeom prst="rect">
+            <a:avLst/>
+          </a:prstGeom>
+          <a:noFill/>
+        </p:spPr>
+        <p:txBody>
+          <a:bodyPr wrap="none" rtlCol="0">
+            <a:spAutoFit/>
+          </a:bodyPr>
+          <a:lstStyle/>
+          <a:p>
+            <a:r>
+              <a:rPr lang="en-US" sz="1400" dirty="0"/>
+              <a:t>1)</a:t>
+            </a:r>
+          </a:p>
+          <a:p>
+            <a:r>
+              <a:rPr lang="en-US" sz="1400" dirty="0"/>
+              <a:t>+0.01Hz+90</a:t>
+            </a:r>
+            <a:r>
+              <a:rPr lang="en-US" sz="1400" baseline="30000" dirty="0"/>
+              <a:t>o</a:t>
+            </a:r>
+            <a:r>
+              <a:rPr lang="en-US" sz="1400" dirty="0"/>
+              <a:t> </a:t>
+            </a:r>
+          </a:p>
+          <a:p>
+            <a:r>
+              <a:rPr lang="en-US" sz="1400" dirty="0"/>
+              <a:t>0.06Hz</a:t>
+            </a:r>
+          </a:p>
+        </p:txBody>
+      </p:sp>
+      <p:sp>
+        <p:nvSpPr>
+          <p:cNvPr id="52" name="TextBox 51">
+            <a:extLst>
+              <a:ext uri="{FF2B5EF4-FFF2-40B4-BE49-F238E27FC236}">
+                <a16:creationId xmlns:a16="http://schemas.microsoft.com/office/drawing/2014/main" id="{54F0677E-9F5E-6D4E-ABF9-3400E6A2E8F6}"/>
+              </a:ext>
+            </a:extLst>
+          </p:cNvPr>
+          <p:cNvSpPr txBox="1"/>
+          <p:nvPr/>
+        </p:nvSpPr>
+        <p:spPr>
+          <a:xfrm>
+            <a:off x="3802063" y="1822315"/>
+            <a:ext cx="1242648" cy="738664"/>
+          </a:xfrm>
+          <a:prstGeom prst="rect">
+            <a:avLst/>
+          </a:prstGeom>
+          <a:noFill/>
+        </p:spPr>
+        <p:txBody>
+          <a:bodyPr wrap="none" rtlCol="0">
+            <a:spAutoFit/>
+          </a:bodyPr>
+          <a:lstStyle/>
+          <a:p>
+            <a:r>
+              <a:rPr lang="en-US" sz="1400" dirty="0"/>
+              <a:t>1)</a:t>
+            </a:r>
+          </a:p>
+          <a:p>
+            <a:r>
+              <a:rPr lang="en-US" sz="1400" dirty="0"/>
+              <a:t>+0.015Hz+45</a:t>
+            </a:r>
+            <a:r>
+              <a:rPr lang="en-US" sz="1400" baseline="30000" dirty="0"/>
+              <a:t>o</a:t>
+            </a:r>
+            <a:r>
+              <a:rPr lang="en-US" sz="1400" dirty="0"/>
+              <a:t> </a:t>
+            </a:r>
+          </a:p>
+          <a:p>
+            <a:r>
+              <a:rPr lang="en-US" sz="1400" dirty="0"/>
+              <a:t>0.065Hz</a:t>
+            </a:r>
+          </a:p>
+        </p:txBody>
+      </p:sp>
+      <p:sp>
+        <p:nvSpPr>
+          <p:cNvPr id="53" name="TextBox 52">
+            <a:extLst>
+              <a:ext uri="{FF2B5EF4-FFF2-40B4-BE49-F238E27FC236}">
+                <a16:creationId xmlns:a16="http://schemas.microsoft.com/office/drawing/2014/main" id="{473625AA-EF0A-8D4D-9D44-3AC1163F1E52}"/>
+              </a:ext>
+            </a:extLst>
+          </p:cNvPr>
+          <p:cNvSpPr txBox="1"/>
+          <p:nvPr/>
+        </p:nvSpPr>
+        <p:spPr>
+          <a:xfrm>
+            <a:off x="3742694" y="3127222"/>
+            <a:ext cx="1242648" cy="738664"/>
+          </a:xfrm>
+          <a:prstGeom prst="rect">
+            <a:avLst/>
+          </a:prstGeom>
+          <a:noFill/>
+        </p:spPr>
+        <p:txBody>
+          <a:bodyPr wrap="none" rtlCol="0">
+            <a:spAutoFit/>
+          </a:bodyPr>
+          <a:lstStyle/>
+          <a:p>
+            <a:r>
+              <a:rPr lang="en-US" sz="1400" dirty="0"/>
+              <a:t>1)</a:t>
+            </a:r>
+          </a:p>
+          <a:p>
+            <a:r>
+              <a:rPr lang="en-US" sz="1400" dirty="0"/>
+              <a:t>+0.005Hz+45</a:t>
+            </a:r>
+            <a:r>
+              <a:rPr lang="en-US" sz="1400" baseline="30000" dirty="0"/>
+              <a:t>o</a:t>
+            </a:r>
+            <a:r>
+              <a:rPr lang="en-US" sz="1400" dirty="0"/>
+              <a:t> </a:t>
+            </a:r>
+          </a:p>
+          <a:p>
+            <a:r>
+              <a:rPr lang="en-US" sz="1400" dirty="0"/>
+              <a:t>0.055Hz</a:t>
+            </a:r>
+          </a:p>
+        </p:txBody>
+      </p:sp>
+      <p:sp>
+        <p:nvSpPr>
+          <p:cNvPr id="54" name="TextBox 53">
+            <a:extLst>
+              <a:ext uri="{FF2B5EF4-FFF2-40B4-BE49-F238E27FC236}">
+                <a16:creationId xmlns:a16="http://schemas.microsoft.com/office/drawing/2014/main" id="{AC24B872-AC27-B04A-B32C-AF142C987292}"/>
+              </a:ext>
+            </a:extLst>
+          </p:cNvPr>
+          <p:cNvSpPr txBox="1"/>
+          <p:nvPr/>
+        </p:nvSpPr>
+        <p:spPr>
+          <a:xfrm>
+            <a:off x="4873312" y="2459038"/>
+            <a:ext cx="1151277" cy="738664"/>
+          </a:xfrm>
+          <a:prstGeom prst="rect">
+            <a:avLst/>
+          </a:prstGeom>
+          <a:noFill/>
+        </p:spPr>
+        <p:txBody>
+          <a:bodyPr wrap="none" rtlCol="0">
+            <a:spAutoFit/>
+          </a:bodyPr>
+          <a:lstStyle/>
+          <a:p>
+            <a:r>
+              <a:rPr lang="en-US" sz="1400" dirty="0"/>
+              <a:t>1)</a:t>
+            </a:r>
+          </a:p>
+          <a:p>
+            <a:r>
+              <a:rPr lang="en-US" sz="1400" dirty="0"/>
+              <a:t>+0.01Hz+90</a:t>
+            </a:r>
+            <a:r>
+              <a:rPr lang="en-US" sz="1400" baseline="30000" dirty="0"/>
+              <a:t>o</a:t>
+            </a:r>
+            <a:r>
+              <a:rPr lang="en-US" sz="1400" dirty="0"/>
+              <a:t> </a:t>
+            </a:r>
+          </a:p>
+          <a:p>
+            <a:r>
+              <a:rPr lang="en-US" sz="1400" dirty="0"/>
+              <a:t>0.06Hz</a:t>
+            </a:r>
+          </a:p>
+        </p:txBody>
+      </p:sp>
+      <p:sp>
+        <p:nvSpPr>
+          <p:cNvPr id="55" name="TextBox 54">
+            <a:extLst>
+              <a:ext uri="{FF2B5EF4-FFF2-40B4-BE49-F238E27FC236}">
+                <a16:creationId xmlns:a16="http://schemas.microsoft.com/office/drawing/2014/main" id="{3CD3E51D-0C0C-5F47-B973-9B9A06E51CC8}"/>
+              </a:ext>
+            </a:extLst>
+          </p:cNvPr>
+          <p:cNvSpPr txBox="1"/>
+          <p:nvPr/>
+        </p:nvSpPr>
+        <p:spPr>
+          <a:xfrm>
+            <a:off x="4920982" y="1830513"/>
+            <a:ext cx="1242648" cy="738664"/>
+          </a:xfrm>
+          <a:prstGeom prst="rect">
+            <a:avLst/>
+          </a:prstGeom>
+          <a:noFill/>
+        </p:spPr>
+        <p:txBody>
+          <a:bodyPr wrap="none" rtlCol="0">
+            <a:spAutoFit/>
+          </a:bodyPr>
+          <a:lstStyle/>
+          <a:p>
+            <a:r>
+              <a:rPr lang="en-US" sz="1400" dirty="0"/>
+              <a:t>1)</a:t>
+            </a:r>
+          </a:p>
+          <a:p>
+            <a:r>
+              <a:rPr lang="en-US" sz="1400" dirty="0"/>
+              <a:t>+0.015Hz+45</a:t>
+            </a:r>
+            <a:r>
+              <a:rPr lang="en-US" sz="1400" baseline="30000" dirty="0"/>
+              <a:t>o</a:t>
+            </a:r>
+            <a:r>
+              <a:rPr lang="en-US" sz="1400" dirty="0"/>
+              <a:t> </a:t>
+            </a:r>
+          </a:p>
+          <a:p>
+            <a:r>
+              <a:rPr lang="en-US" sz="1400" dirty="0"/>
+              <a:t>0.065Hz</a:t>
+            </a:r>
+          </a:p>
+        </p:txBody>
+      </p:sp>
+      <p:sp>
+        <p:nvSpPr>
+          <p:cNvPr id="56" name="TextBox 55">
+            <a:extLst>
+              <a:ext uri="{FF2B5EF4-FFF2-40B4-BE49-F238E27FC236}">
+                <a16:creationId xmlns:a16="http://schemas.microsoft.com/office/drawing/2014/main" id="{86738AC0-A7C2-C24D-A6E6-DDD25F5DA12C}"/>
+              </a:ext>
+            </a:extLst>
+          </p:cNvPr>
+          <p:cNvSpPr txBox="1"/>
+          <p:nvPr/>
+        </p:nvSpPr>
+        <p:spPr>
+          <a:xfrm>
+            <a:off x="4861613" y="3153350"/>
+            <a:ext cx="1242648" cy="738664"/>
+          </a:xfrm>
+          <a:prstGeom prst="rect">
+            <a:avLst/>
+          </a:prstGeom>
+          <a:noFill/>
+        </p:spPr>
+        <p:txBody>
+          <a:bodyPr wrap="none" rtlCol="0">
+            <a:spAutoFit/>
+          </a:bodyPr>
+          <a:lstStyle/>
+          <a:p>
+            <a:r>
+              <a:rPr lang="en-US" sz="1400" dirty="0"/>
+              <a:t>1)</a:t>
+            </a:r>
+          </a:p>
+          <a:p>
+            <a:r>
+              <a:rPr lang="en-US" sz="1400" dirty="0"/>
+              <a:t>+0.005Hz+45</a:t>
+            </a:r>
+            <a:r>
+              <a:rPr lang="en-US" sz="1400" baseline="30000" dirty="0"/>
+              <a:t>o</a:t>
+            </a:r>
+            <a:r>
+              <a:rPr lang="en-US" sz="1400" dirty="0"/>
+              <a:t> </a:t>
+            </a:r>
+          </a:p>
+          <a:p>
+            <a:r>
+              <a:rPr lang="en-US" sz="1400" dirty="0"/>
+              <a:t>0.055Hz</a:t>
+            </a:r>
+          </a:p>
+        </p:txBody>
+      </p:sp>
+      <p:sp>
+        <p:nvSpPr>
+          <p:cNvPr id="57" name="TextBox 56">
+            <a:extLst>
+              <a:ext uri="{FF2B5EF4-FFF2-40B4-BE49-F238E27FC236}">
+                <a16:creationId xmlns:a16="http://schemas.microsoft.com/office/drawing/2014/main" id="{EEBF7002-267D-954E-91BF-AA980637DC43}"/>
+              </a:ext>
+            </a:extLst>
+          </p:cNvPr>
+          <p:cNvSpPr txBox="1"/>
+          <p:nvPr/>
+        </p:nvSpPr>
+        <p:spPr>
+          <a:xfrm>
+            <a:off x="2554573" y="4930958"/>
+            <a:ext cx="1207382" cy="738664"/>
+          </a:xfrm>
+          <a:prstGeom prst="rect">
+            <a:avLst/>
+          </a:prstGeom>
+          <a:noFill/>
+        </p:spPr>
+        <p:txBody>
+          <a:bodyPr wrap="none" rtlCol="0">
+            <a:spAutoFit/>
+          </a:bodyPr>
+          <a:lstStyle/>
+          <a:p>
+            <a:r>
+              <a:rPr lang="en-US" sz="1400" dirty="0"/>
+              <a:t>2)</a:t>
+            </a:r>
+          </a:p>
+          <a:p>
+            <a:r>
+              <a:rPr lang="en-US" sz="1400" dirty="0"/>
+              <a:t>-0.005Hz+90</a:t>
+            </a:r>
+            <a:r>
+              <a:rPr lang="en-US" sz="1400" baseline="30000" dirty="0"/>
+              <a:t>o</a:t>
+            </a:r>
+            <a:r>
+              <a:rPr lang="en-US" sz="1400" dirty="0"/>
+              <a:t> </a:t>
+            </a:r>
+          </a:p>
+          <a:p>
+            <a:r>
+              <a:rPr lang="en-US" sz="1400" dirty="0"/>
+              <a:t>0.035Hz</a:t>
+            </a:r>
+          </a:p>
+        </p:txBody>
+      </p:sp>
+      <p:sp>
+        <p:nvSpPr>
+          <p:cNvPr id="58" name="TextBox 57">
+            <a:extLst>
+              <a:ext uri="{FF2B5EF4-FFF2-40B4-BE49-F238E27FC236}">
+                <a16:creationId xmlns:a16="http://schemas.microsoft.com/office/drawing/2014/main" id="{0E8FF336-F810-3D4C-9082-E1301724FE2B}"/>
+              </a:ext>
+            </a:extLst>
+          </p:cNvPr>
+          <p:cNvSpPr txBox="1"/>
+          <p:nvPr/>
+        </p:nvSpPr>
+        <p:spPr>
+          <a:xfrm>
+            <a:off x="6228600" y="5245357"/>
+            <a:ext cx="1207382" cy="738664"/>
+          </a:xfrm>
+          <a:prstGeom prst="rect">
+            <a:avLst/>
+          </a:prstGeom>
+          <a:noFill/>
+        </p:spPr>
+        <p:txBody>
+          <a:bodyPr wrap="none" rtlCol="0">
+            <a:spAutoFit/>
+          </a:bodyPr>
+          <a:lstStyle/>
+          <a:p>
+            <a:r>
+              <a:rPr lang="en-US" sz="1400" dirty="0"/>
+              <a:t>2)</a:t>
+            </a:r>
+          </a:p>
+          <a:p>
+            <a:r>
+              <a:rPr lang="en-US" sz="1400" dirty="0"/>
+              <a:t>-0.005Hz+90</a:t>
+            </a:r>
+            <a:r>
+              <a:rPr lang="en-US" sz="1400" baseline="30000" dirty="0"/>
+              <a:t>o</a:t>
+            </a:r>
+            <a:r>
+              <a:rPr lang="en-US" sz="1400" dirty="0"/>
+              <a:t> </a:t>
+            </a:r>
+          </a:p>
+          <a:p>
+            <a:r>
+              <a:rPr lang="en-US" sz="1400" dirty="0"/>
+              <a:t>0.035Hz</a:t>
+            </a:r>
+          </a:p>
+        </p:txBody>
+      </p:sp>
+      <p:sp>
+        <p:nvSpPr>
+          <p:cNvPr id="59" name="TextBox 58">
+            <a:extLst>
+              <a:ext uri="{FF2B5EF4-FFF2-40B4-BE49-F238E27FC236}">
+                <a16:creationId xmlns:a16="http://schemas.microsoft.com/office/drawing/2014/main" id="{21DBD4CB-A249-2945-A55F-33C9F4DB6724}"/>
+              </a:ext>
+            </a:extLst>
+          </p:cNvPr>
+          <p:cNvSpPr txBox="1"/>
+          <p:nvPr/>
+        </p:nvSpPr>
+        <p:spPr>
+          <a:xfrm>
+            <a:off x="7282427" y="5227479"/>
+            <a:ext cx="1207382" cy="738664"/>
+          </a:xfrm>
+          <a:prstGeom prst="rect">
+            <a:avLst/>
+          </a:prstGeom>
+          <a:noFill/>
+        </p:spPr>
+        <p:txBody>
+          <a:bodyPr wrap="none" rtlCol="0">
+            <a:spAutoFit/>
+          </a:bodyPr>
+          <a:lstStyle/>
+          <a:p>
+            <a:r>
+              <a:rPr lang="en-US" sz="1400" dirty="0"/>
+              <a:t>2)</a:t>
+            </a:r>
+          </a:p>
+          <a:p>
+            <a:r>
+              <a:rPr lang="en-US" sz="1400" dirty="0"/>
+              <a:t>-0.005Hz+90</a:t>
+            </a:r>
+            <a:r>
+              <a:rPr lang="en-US" sz="1400" baseline="30000" dirty="0"/>
+              <a:t>o</a:t>
+            </a:r>
+            <a:r>
+              <a:rPr lang="en-US" sz="1400" dirty="0"/>
+              <a:t> </a:t>
+            </a:r>
+          </a:p>
+          <a:p>
+            <a:r>
+              <a:rPr lang="en-US" sz="1400" dirty="0"/>
+              <a:t>0.035Hz</a:t>
+            </a:r>
+          </a:p>
+        </p:txBody>
+      </p:sp>
+      <p:sp>
+        <p:nvSpPr>
+          <p:cNvPr id="60" name="TextBox 59">
+            <a:extLst>
+              <a:ext uri="{FF2B5EF4-FFF2-40B4-BE49-F238E27FC236}">
+                <a16:creationId xmlns:a16="http://schemas.microsoft.com/office/drawing/2014/main" id="{DB5F8D87-6C53-1F4F-B517-F723FBB69E0D}"/>
+              </a:ext>
+            </a:extLst>
+          </p:cNvPr>
+          <p:cNvSpPr txBox="1"/>
+          <p:nvPr/>
+        </p:nvSpPr>
+        <p:spPr>
+          <a:xfrm>
+            <a:off x="3905883" y="1267081"/>
+            <a:ext cx="686406" cy="523220"/>
+          </a:xfrm>
+          <a:prstGeom prst="rect">
+            <a:avLst/>
+          </a:prstGeom>
+          <a:noFill/>
+        </p:spPr>
+        <p:txBody>
+          <a:bodyPr wrap="none" rtlCol="0">
+            <a:spAutoFit/>
+          </a:bodyPr>
+          <a:lstStyle/>
+          <a:p>
+            <a:r>
+              <a:rPr lang="en-US" sz="1400" dirty="0"/>
+              <a:t>1)</a:t>
+            </a:r>
+          </a:p>
+          <a:p>
+            <a:r>
+              <a:rPr lang="en-US" sz="1400" dirty="0"/>
+              <a:t>0.05Hz</a:t>
+            </a:r>
+          </a:p>
+        </p:txBody>
+      </p:sp>
+      <p:sp>
+        <p:nvSpPr>
+          <p:cNvPr id="61" name="TextBox 60">
+            <a:extLst>
+              <a:ext uri="{FF2B5EF4-FFF2-40B4-BE49-F238E27FC236}">
+                <a16:creationId xmlns:a16="http://schemas.microsoft.com/office/drawing/2014/main" id="{638B2E73-6A07-5F4E-A1D2-391E1902917A}"/>
+              </a:ext>
+            </a:extLst>
+          </p:cNvPr>
+          <p:cNvSpPr txBox="1"/>
+          <p:nvPr/>
+        </p:nvSpPr>
+        <p:spPr>
+          <a:xfrm>
+            <a:off x="5071739" y="1294229"/>
+            <a:ext cx="686406" cy="523220"/>
+          </a:xfrm>
+          <a:prstGeom prst="rect">
+            <a:avLst/>
+          </a:prstGeom>
+          <a:noFill/>
+        </p:spPr>
+        <p:txBody>
+          <a:bodyPr wrap="none" rtlCol="0">
+            <a:spAutoFit/>
+          </a:bodyPr>
+          <a:lstStyle/>
+          <a:p>
+            <a:r>
+              <a:rPr lang="en-US" sz="1400" dirty="0"/>
+              <a:t>1)</a:t>
+            </a:r>
+          </a:p>
+          <a:p>
+            <a:r>
+              <a:rPr lang="en-US" sz="1400" dirty="0"/>
+              <a:t>0.05Hz</a:t>
+            </a:r>
+          </a:p>
+        </p:txBody>
+      </p:sp>
+      <p:sp>
+        <p:nvSpPr>
+          <p:cNvPr id="62" name="TextBox 61">
+            <a:extLst>
+              <a:ext uri="{FF2B5EF4-FFF2-40B4-BE49-F238E27FC236}">
+                <a16:creationId xmlns:a16="http://schemas.microsoft.com/office/drawing/2014/main" id="{91135BD4-97D1-2843-A745-749FB69C4A98}"/>
+              </a:ext>
+            </a:extLst>
+          </p:cNvPr>
+          <p:cNvSpPr txBox="1"/>
+          <p:nvPr/>
+        </p:nvSpPr>
+        <p:spPr>
+          <a:xfrm>
+            <a:off x="1537932" y="1697950"/>
+            <a:ext cx="686406" cy="523220"/>
+          </a:xfrm>
+          <a:prstGeom prst="rect">
+            <a:avLst/>
+          </a:prstGeom>
+          <a:noFill/>
+        </p:spPr>
+        <p:txBody>
+          <a:bodyPr wrap="none" rtlCol="0">
+            <a:spAutoFit/>
+          </a:bodyPr>
+          <a:lstStyle/>
+          <a:p>
+            <a:r>
+              <a:rPr lang="en-US" sz="1400" dirty="0"/>
+              <a:t>1)</a:t>
+            </a:r>
+          </a:p>
+          <a:p>
+            <a:r>
+              <a:rPr lang="en-US" sz="1400" dirty="0"/>
+              <a:t>0.05Hz</a:t>
+            </a:r>
+          </a:p>
+        </p:txBody>
+      </p:sp>
+      <p:sp>
+        <p:nvSpPr>
+          <p:cNvPr id="63" name="TextBox 62">
+            <a:extLst>
+              <a:ext uri="{FF2B5EF4-FFF2-40B4-BE49-F238E27FC236}">
+                <a16:creationId xmlns:a16="http://schemas.microsoft.com/office/drawing/2014/main" id="{C0B75C2E-2136-0945-8F8F-600BD0BDCAA1}"/>
+              </a:ext>
+            </a:extLst>
+          </p:cNvPr>
+          <p:cNvSpPr txBox="1"/>
+          <p:nvPr/>
+        </p:nvSpPr>
+        <p:spPr>
+          <a:xfrm>
+            <a:off x="6393994" y="1547124"/>
+            <a:ext cx="686406" cy="523220"/>
+          </a:xfrm>
+          <a:prstGeom prst="rect">
+            <a:avLst/>
+          </a:prstGeom>
+          <a:noFill/>
+        </p:spPr>
+        <p:txBody>
+          <a:bodyPr wrap="none" rtlCol="0">
+            <a:spAutoFit/>
+          </a:bodyPr>
+          <a:lstStyle/>
+          <a:p>
+            <a:r>
+              <a:rPr lang="en-US" sz="1400" dirty="0"/>
+              <a:t>1)</a:t>
+            </a:r>
+          </a:p>
+          <a:p>
+            <a:r>
+              <a:rPr lang="en-US" sz="1400" dirty="0"/>
+              <a:t>0.05Hz</a:t>
+            </a:r>
+          </a:p>
+        </p:txBody>
+      </p:sp>
+      <p:sp>
+        <p:nvSpPr>
+          <p:cNvPr id="64" name="TextBox 63">
+            <a:extLst>
+              <a:ext uri="{FF2B5EF4-FFF2-40B4-BE49-F238E27FC236}">
+                <a16:creationId xmlns:a16="http://schemas.microsoft.com/office/drawing/2014/main" id="{22AEEBC5-6694-8D48-B90A-E9698C1AF773}"/>
+              </a:ext>
+            </a:extLst>
+          </p:cNvPr>
+          <p:cNvSpPr txBox="1"/>
+          <p:nvPr/>
+        </p:nvSpPr>
+        <p:spPr>
+          <a:xfrm>
+            <a:off x="7433455" y="1636589"/>
+            <a:ext cx="686406" cy="523220"/>
+          </a:xfrm>
+          <a:prstGeom prst="rect">
+            <a:avLst/>
+          </a:prstGeom>
+          <a:noFill/>
+        </p:spPr>
+        <p:txBody>
+          <a:bodyPr wrap="none" rtlCol="0">
+            <a:spAutoFit/>
+          </a:bodyPr>
+          <a:lstStyle/>
+          <a:p>
+            <a:r>
+              <a:rPr lang="en-US" sz="1400" dirty="0"/>
+              <a:t>1)</a:t>
+            </a:r>
+          </a:p>
+          <a:p>
+            <a:r>
+              <a:rPr lang="en-US" sz="1400" dirty="0"/>
+              <a:t>0.05Hz</a:t>
+            </a:r>
+          </a:p>
+        </p:txBody>
+      </p:sp>
+      <p:sp>
+        <p:nvSpPr>
+          <p:cNvPr id="65" name="TextBox 64">
+            <a:extLst>
+              <a:ext uri="{FF2B5EF4-FFF2-40B4-BE49-F238E27FC236}">
+                <a16:creationId xmlns:a16="http://schemas.microsoft.com/office/drawing/2014/main" id="{03D401D9-BAC7-C041-A332-B3EB0EB5AFBB}"/>
+              </a:ext>
+            </a:extLst>
+          </p:cNvPr>
+          <p:cNvSpPr txBox="1"/>
+          <p:nvPr/>
+        </p:nvSpPr>
+        <p:spPr>
+          <a:xfrm>
+            <a:off x="8790439" y="2052603"/>
+            <a:ext cx="686406" cy="523220"/>
+          </a:xfrm>
+          <a:prstGeom prst="rect">
+            <a:avLst/>
+          </a:prstGeom>
+          <a:noFill/>
+        </p:spPr>
+        <p:txBody>
+          <a:bodyPr wrap="none" rtlCol="0">
+            <a:spAutoFit/>
+          </a:bodyPr>
+          <a:lstStyle/>
+          <a:p>
+            <a:r>
+              <a:rPr lang="en-US" sz="1400" dirty="0"/>
+              <a:t>1)</a:t>
+            </a:r>
+          </a:p>
+          <a:p>
+            <a:r>
+              <a:rPr lang="en-US" sz="1400" dirty="0"/>
+              <a:t>0.05Hz</a:t>
+            </a:r>
+          </a:p>
+        </p:txBody>
+      </p:sp>
+      <p:sp>
+        <p:nvSpPr>
+          <p:cNvPr id="66" name="TextBox 65">
+            <a:extLst>
+              <a:ext uri="{FF2B5EF4-FFF2-40B4-BE49-F238E27FC236}">
+                <a16:creationId xmlns:a16="http://schemas.microsoft.com/office/drawing/2014/main" id="{C3121BB1-2AE3-454B-8EC2-59E95EEC3EDF}"/>
+              </a:ext>
+            </a:extLst>
+          </p:cNvPr>
+          <p:cNvSpPr txBox="1"/>
+          <p:nvPr/>
+        </p:nvSpPr>
+        <p:spPr>
+          <a:xfrm>
+            <a:off x="9831557" y="1994430"/>
+            <a:ext cx="686406" cy="523220"/>
+          </a:xfrm>
+          <a:prstGeom prst="rect">
+            <a:avLst/>
+          </a:prstGeom>
+          <a:noFill/>
+        </p:spPr>
+        <p:txBody>
+          <a:bodyPr wrap="none" rtlCol="0">
+            <a:spAutoFit/>
+          </a:bodyPr>
+          <a:lstStyle/>
+          <a:p>
+            <a:r>
+              <a:rPr lang="en-US" sz="1400" dirty="0"/>
+              <a:t>1)</a:t>
+            </a:r>
+          </a:p>
+          <a:p>
+            <a:r>
+              <a:rPr lang="en-US" sz="1400" dirty="0"/>
+              <a:t>0.05Hz</a:t>
+            </a:r>
+          </a:p>
+        </p:txBody>
+      </p:sp>
+      <p:sp>
+        <p:nvSpPr>
+          <p:cNvPr id="67" name="TextBox 66">
+            <a:extLst>
+              <a:ext uri="{FF2B5EF4-FFF2-40B4-BE49-F238E27FC236}">
+                <a16:creationId xmlns:a16="http://schemas.microsoft.com/office/drawing/2014/main" id="{8DDE0034-A7C4-A04F-8878-60F389E38F6E}"/>
+              </a:ext>
+            </a:extLst>
+          </p:cNvPr>
+          <p:cNvSpPr txBox="1"/>
+          <p:nvPr/>
+        </p:nvSpPr>
+        <p:spPr>
+          <a:xfrm>
+            <a:off x="11068817" y="2070344"/>
+            <a:ext cx="686406" cy="523220"/>
+          </a:xfrm>
+          <a:prstGeom prst="rect">
+            <a:avLst/>
+          </a:prstGeom>
+          <a:noFill/>
+        </p:spPr>
+        <p:txBody>
+          <a:bodyPr wrap="none" rtlCol="0">
+            <a:spAutoFit/>
+          </a:bodyPr>
+          <a:lstStyle/>
+          <a:p>
+            <a:r>
+              <a:rPr lang="en-US" sz="1400" dirty="0"/>
+              <a:t>1)</a:t>
+            </a:r>
+          </a:p>
+          <a:p>
+            <a:r>
+              <a:rPr lang="en-US" sz="1400" dirty="0"/>
+              <a:t>0.05Hz</a:t>
+            </a:r>
+          </a:p>
+        </p:txBody>
+      </p:sp>
+      <p:sp>
+        <p:nvSpPr>
+          <p:cNvPr id="68" name="TextBox 67">
+            <a:extLst>
+              <a:ext uri="{FF2B5EF4-FFF2-40B4-BE49-F238E27FC236}">
+                <a16:creationId xmlns:a16="http://schemas.microsoft.com/office/drawing/2014/main" id="{FE21FF3F-8E0C-8342-9EAD-C76DCDECE4A4}"/>
+              </a:ext>
+            </a:extLst>
+          </p:cNvPr>
+          <p:cNvSpPr txBox="1"/>
+          <p:nvPr/>
+        </p:nvSpPr>
+        <p:spPr>
+          <a:xfrm>
+            <a:off x="2544795" y="4304031"/>
+            <a:ext cx="1298753" cy="738664"/>
+          </a:xfrm>
+          <a:prstGeom prst="rect">
+            <a:avLst/>
+          </a:prstGeom>
+          <a:noFill/>
+        </p:spPr>
+        <p:txBody>
+          <a:bodyPr wrap="none" rtlCol="0">
+            <a:spAutoFit/>
+          </a:bodyPr>
+          <a:lstStyle/>
+          <a:p>
+            <a:r>
+              <a:rPr lang="en-US" sz="1400" dirty="0"/>
+              <a:t>2)</a:t>
+            </a:r>
+          </a:p>
+          <a:p>
+            <a:r>
+              <a:rPr lang="en-US" sz="1400" dirty="0"/>
+              <a:t>-0.0075Hz+45</a:t>
+            </a:r>
+            <a:r>
+              <a:rPr lang="en-US" sz="1400" baseline="30000" dirty="0"/>
+              <a:t>o</a:t>
+            </a:r>
+            <a:r>
+              <a:rPr lang="en-US" sz="1400" dirty="0"/>
+              <a:t> </a:t>
+            </a:r>
+          </a:p>
+          <a:p>
+            <a:r>
+              <a:rPr lang="en-US" sz="1400" dirty="0"/>
+              <a:t>0.0325Hz</a:t>
+            </a:r>
+          </a:p>
+        </p:txBody>
+      </p:sp>
+      <p:sp>
+        <p:nvSpPr>
+          <p:cNvPr id="69" name="TextBox 68">
+            <a:extLst>
+              <a:ext uri="{FF2B5EF4-FFF2-40B4-BE49-F238E27FC236}">
+                <a16:creationId xmlns:a16="http://schemas.microsoft.com/office/drawing/2014/main" id="{ECC932D2-2D43-1542-AD74-7482BC63E599}"/>
+              </a:ext>
+            </a:extLst>
+          </p:cNvPr>
+          <p:cNvSpPr txBox="1"/>
+          <p:nvPr/>
+        </p:nvSpPr>
+        <p:spPr>
+          <a:xfrm>
+            <a:off x="2464739" y="5710997"/>
+            <a:ext cx="1382110" cy="600164"/>
+          </a:xfrm>
+          <a:prstGeom prst="rect">
+            <a:avLst/>
+          </a:prstGeom>
+          <a:noFill/>
+        </p:spPr>
+        <p:txBody>
+          <a:bodyPr wrap="none" rtlCol="0">
+            <a:spAutoFit/>
+          </a:bodyPr>
+          <a:lstStyle/>
+          <a:p>
+            <a:r>
+              <a:rPr lang="en-US" sz="1100" dirty="0"/>
+              <a:t>2)</a:t>
+            </a:r>
+          </a:p>
+          <a:p>
+            <a:r>
+              <a:rPr lang="en-US" sz="1100" dirty="0"/>
+              <a:t>-0.0025Hz+ 90</a:t>
+            </a:r>
+            <a:r>
+              <a:rPr lang="en-US" sz="1100" baseline="30000" dirty="0"/>
+              <a:t>o </a:t>
+            </a:r>
+            <a:r>
+              <a:rPr lang="en-US" sz="1100" dirty="0"/>
+              <a:t>+45</a:t>
+            </a:r>
+            <a:r>
+              <a:rPr lang="en-US" sz="1100" baseline="30000" dirty="0"/>
+              <a:t>o</a:t>
+            </a:r>
+            <a:r>
+              <a:rPr lang="en-US" sz="1100" dirty="0"/>
+              <a:t> </a:t>
+            </a:r>
+          </a:p>
+          <a:p>
+            <a:r>
+              <a:rPr lang="en-US" sz="1100" dirty="0"/>
+              <a:t>0.0375Hz</a:t>
+            </a:r>
+          </a:p>
+        </p:txBody>
+      </p:sp>
+      <p:sp>
+        <p:nvSpPr>
+          <p:cNvPr id="70" name="TextBox 69">
+            <a:extLst>
+              <a:ext uri="{FF2B5EF4-FFF2-40B4-BE49-F238E27FC236}">
+                <a16:creationId xmlns:a16="http://schemas.microsoft.com/office/drawing/2014/main" id="{7F2FC325-B1B5-564B-858A-CD17E5180596}"/>
+              </a:ext>
+            </a:extLst>
+          </p:cNvPr>
+          <p:cNvSpPr txBox="1"/>
+          <p:nvPr/>
+        </p:nvSpPr>
+        <p:spPr>
+          <a:xfrm>
+            <a:off x="3755736" y="4911484"/>
+            <a:ext cx="1207382" cy="738664"/>
+          </a:xfrm>
+          <a:prstGeom prst="rect">
+            <a:avLst/>
+          </a:prstGeom>
+          <a:noFill/>
+        </p:spPr>
+        <p:txBody>
+          <a:bodyPr wrap="none" rtlCol="0">
+            <a:spAutoFit/>
+          </a:bodyPr>
+          <a:lstStyle/>
+          <a:p>
+            <a:r>
+              <a:rPr lang="en-US" sz="1400" dirty="0"/>
+              <a:t>2)</a:t>
+            </a:r>
+          </a:p>
+          <a:p>
+            <a:r>
+              <a:rPr lang="en-US" sz="1400" dirty="0"/>
+              <a:t>-0.005Hz+90</a:t>
+            </a:r>
+            <a:r>
+              <a:rPr lang="en-US" sz="1400" baseline="30000" dirty="0"/>
+              <a:t>o</a:t>
+            </a:r>
+            <a:r>
+              <a:rPr lang="en-US" sz="1400" dirty="0"/>
+              <a:t> </a:t>
+            </a:r>
+          </a:p>
+          <a:p>
+            <a:r>
+              <a:rPr lang="en-US" sz="1400" dirty="0"/>
+              <a:t>0.035Hz</a:t>
+            </a:r>
+          </a:p>
+        </p:txBody>
+      </p:sp>
+      <p:sp>
+        <p:nvSpPr>
+          <p:cNvPr id="71" name="TextBox 70">
+            <a:extLst>
+              <a:ext uri="{FF2B5EF4-FFF2-40B4-BE49-F238E27FC236}">
+                <a16:creationId xmlns:a16="http://schemas.microsoft.com/office/drawing/2014/main" id="{DDFE5965-08F0-1D4E-B7A2-2B76449F5777}"/>
+              </a:ext>
+            </a:extLst>
+          </p:cNvPr>
+          <p:cNvSpPr txBox="1"/>
+          <p:nvPr/>
+        </p:nvSpPr>
+        <p:spPr>
+          <a:xfrm>
+            <a:off x="3745958" y="4284557"/>
+            <a:ext cx="1298753" cy="738664"/>
+          </a:xfrm>
+          <a:prstGeom prst="rect">
+            <a:avLst/>
+          </a:prstGeom>
+          <a:noFill/>
+        </p:spPr>
+        <p:txBody>
+          <a:bodyPr wrap="none" rtlCol="0">
+            <a:spAutoFit/>
+          </a:bodyPr>
+          <a:lstStyle/>
+          <a:p>
+            <a:r>
+              <a:rPr lang="en-US" sz="1400" dirty="0"/>
+              <a:t>2)</a:t>
+            </a:r>
+          </a:p>
+          <a:p>
+            <a:r>
+              <a:rPr lang="en-US" sz="1400" dirty="0"/>
+              <a:t>-0.0075Hz+45</a:t>
+            </a:r>
+            <a:r>
+              <a:rPr lang="en-US" sz="1400" baseline="30000" dirty="0"/>
+              <a:t>o</a:t>
+            </a:r>
+            <a:r>
+              <a:rPr lang="en-US" sz="1400" dirty="0"/>
+              <a:t> </a:t>
+            </a:r>
+          </a:p>
+          <a:p>
+            <a:r>
+              <a:rPr lang="en-US" sz="1400" dirty="0"/>
+              <a:t>0.0325Hz</a:t>
+            </a:r>
+          </a:p>
+        </p:txBody>
+      </p:sp>
+      <p:sp>
+        <p:nvSpPr>
+          <p:cNvPr id="72" name="TextBox 71">
+            <a:extLst>
+              <a:ext uri="{FF2B5EF4-FFF2-40B4-BE49-F238E27FC236}">
+                <a16:creationId xmlns:a16="http://schemas.microsoft.com/office/drawing/2014/main" id="{76BA3E52-1CC5-BE46-B32D-D64FEBC9A5BC}"/>
+              </a:ext>
+            </a:extLst>
+          </p:cNvPr>
+          <p:cNvSpPr txBox="1"/>
+          <p:nvPr/>
+        </p:nvSpPr>
+        <p:spPr>
+          <a:xfrm>
+            <a:off x="3665902" y="5691523"/>
+            <a:ext cx="1382110" cy="600164"/>
+          </a:xfrm>
+          <a:prstGeom prst="rect">
+            <a:avLst/>
+          </a:prstGeom>
+          <a:noFill/>
+        </p:spPr>
+        <p:txBody>
+          <a:bodyPr wrap="none" rtlCol="0">
+            <a:spAutoFit/>
+          </a:bodyPr>
+          <a:lstStyle/>
+          <a:p>
+            <a:r>
+              <a:rPr lang="en-US" sz="1100" dirty="0"/>
+              <a:t>2)</a:t>
+            </a:r>
+          </a:p>
+          <a:p>
+            <a:r>
+              <a:rPr lang="en-US" sz="1100" dirty="0"/>
+              <a:t>-0.0025Hz+ 90</a:t>
+            </a:r>
+            <a:r>
+              <a:rPr lang="en-US" sz="1100" baseline="30000" dirty="0"/>
+              <a:t>o </a:t>
+            </a:r>
+            <a:r>
+              <a:rPr lang="en-US" sz="1100" dirty="0"/>
+              <a:t>+45</a:t>
+            </a:r>
+            <a:r>
+              <a:rPr lang="en-US" sz="1100" baseline="30000" dirty="0"/>
+              <a:t>o</a:t>
+            </a:r>
+            <a:r>
+              <a:rPr lang="en-US" sz="1100" dirty="0"/>
+              <a:t> </a:t>
+            </a:r>
+          </a:p>
+          <a:p>
+            <a:r>
+              <a:rPr lang="en-US" sz="1100" dirty="0"/>
+              <a:t>0.0375Hz</a:t>
+            </a:r>
+          </a:p>
+        </p:txBody>
+      </p:sp>
+      <p:sp>
+        <p:nvSpPr>
+          <p:cNvPr id="73" name="TextBox 72">
+            <a:extLst>
+              <a:ext uri="{FF2B5EF4-FFF2-40B4-BE49-F238E27FC236}">
+                <a16:creationId xmlns:a16="http://schemas.microsoft.com/office/drawing/2014/main" id="{46ADA5AA-B584-DA45-8ACC-98664D1422C5}"/>
+              </a:ext>
+            </a:extLst>
+          </p:cNvPr>
+          <p:cNvSpPr txBox="1"/>
+          <p:nvPr/>
+        </p:nvSpPr>
+        <p:spPr>
+          <a:xfrm>
+            <a:off x="4955935" y="4967160"/>
+            <a:ext cx="1207382" cy="738664"/>
+          </a:xfrm>
+          <a:prstGeom prst="rect">
+            <a:avLst/>
+          </a:prstGeom>
+          <a:noFill/>
+        </p:spPr>
+        <p:txBody>
+          <a:bodyPr wrap="none" rtlCol="0">
+            <a:spAutoFit/>
+          </a:bodyPr>
+          <a:lstStyle/>
+          <a:p>
+            <a:r>
+              <a:rPr lang="en-US" sz="1400" dirty="0"/>
+              <a:t>2)</a:t>
+            </a:r>
+          </a:p>
+          <a:p>
+            <a:r>
+              <a:rPr lang="en-US" sz="1400" dirty="0"/>
+              <a:t>-0.005Hz+90</a:t>
+            </a:r>
+            <a:r>
+              <a:rPr lang="en-US" sz="1400" baseline="30000" dirty="0"/>
+              <a:t>o</a:t>
+            </a:r>
+            <a:r>
+              <a:rPr lang="en-US" sz="1400" dirty="0"/>
+              <a:t> </a:t>
+            </a:r>
+          </a:p>
+          <a:p>
+            <a:r>
+              <a:rPr lang="en-US" sz="1400" dirty="0"/>
+              <a:t>0.035Hz</a:t>
+            </a:r>
+          </a:p>
+        </p:txBody>
+      </p:sp>
+      <p:sp>
+        <p:nvSpPr>
+          <p:cNvPr id="74" name="TextBox 73">
+            <a:extLst>
+              <a:ext uri="{FF2B5EF4-FFF2-40B4-BE49-F238E27FC236}">
+                <a16:creationId xmlns:a16="http://schemas.microsoft.com/office/drawing/2014/main" id="{D3AA801C-1817-2A4D-84F1-EB5BFF9CF384}"/>
+              </a:ext>
+            </a:extLst>
+          </p:cNvPr>
+          <p:cNvSpPr txBox="1"/>
+          <p:nvPr/>
+        </p:nvSpPr>
+        <p:spPr>
+          <a:xfrm>
+            <a:off x="4946157" y="4286443"/>
+            <a:ext cx="1298753" cy="738664"/>
+          </a:xfrm>
+          <a:prstGeom prst="rect">
+            <a:avLst/>
+          </a:prstGeom>
+          <a:noFill/>
+        </p:spPr>
+        <p:txBody>
+          <a:bodyPr wrap="none" rtlCol="0">
+            <a:spAutoFit/>
+          </a:bodyPr>
+          <a:lstStyle/>
+          <a:p>
+            <a:r>
+              <a:rPr lang="en-US" sz="1400" dirty="0"/>
+              <a:t>2)</a:t>
+            </a:r>
+          </a:p>
+          <a:p>
+            <a:r>
+              <a:rPr lang="en-US" sz="1400" dirty="0"/>
+              <a:t>-0.0075Hz+45</a:t>
+            </a:r>
+            <a:r>
+              <a:rPr lang="en-US" sz="1400" baseline="30000" dirty="0"/>
+              <a:t>o</a:t>
+            </a:r>
+            <a:r>
+              <a:rPr lang="en-US" sz="1400" dirty="0"/>
+              <a:t> </a:t>
+            </a:r>
+          </a:p>
+          <a:p>
+            <a:r>
+              <a:rPr lang="en-US" sz="1400" dirty="0"/>
+              <a:t>0.0325Hz</a:t>
+            </a:r>
+          </a:p>
+        </p:txBody>
+      </p:sp>
+      <p:sp>
+        <p:nvSpPr>
+          <p:cNvPr id="75" name="TextBox 74">
+            <a:extLst>
+              <a:ext uri="{FF2B5EF4-FFF2-40B4-BE49-F238E27FC236}">
+                <a16:creationId xmlns:a16="http://schemas.microsoft.com/office/drawing/2014/main" id="{EB0FE66E-037B-9B45-BF52-7F828C354836}"/>
+              </a:ext>
+            </a:extLst>
+          </p:cNvPr>
+          <p:cNvSpPr txBox="1"/>
+          <p:nvPr/>
+        </p:nvSpPr>
+        <p:spPr>
+          <a:xfrm>
+            <a:off x="4866101" y="5747199"/>
+            <a:ext cx="1382110" cy="600164"/>
+          </a:xfrm>
+          <a:prstGeom prst="rect">
+            <a:avLst/>
+          </a:prstGeom>
+          <a:noFill/>
+        </p:spPr>
+        <p:txBody>
+          <a:bodyPr wrap="none" rtlCol="0">
+            <a:spAutoFit/>
+          </a:bodyPr>
+          <a:lstStyle/>
+          <a:p>
+            <a:r>
+              <a:rPr lang="en-US" sz="1100" dirty="0"/>
+              <a:t>2)</a:t>
+            </a:r>
+          </a:p>
+          <a:p>
+            <a:r>
+              <a:rPr lang="en-US" sz="1100" dirty="0"/>
+              <a:t>-0.0025Hz+ 90</a:t>
+            </a:r>
+            <a:r>
+              <a:rPr lang="en-US" sz="1100" baseline="30000" dirty="0"/>
+              <a:t>o </a:t>
+            </a:r>
+            <a:r>
+              <a:rPr lang="en-US" sz="1100" dirty="0"/>
+              <a:t>+45</a:t>
+            </a:r>
+            <a:r>
+              <a:rPr lang="en-US" sz="1100" baseline="30000" dirty="0"/>
+              <a:t>o</a:t>
+            </a:r>
+            <a:r>
+              <a:rPr lang="en-US" sz="1100" dirty="0"/>
+              <a:t> </a:t>
+            </a:r>
+          </a:p>
+          <a:p>
+            <a:r>
+              <a:rPr lang="en-US" sz="1100" dirty="0"/>
+              <a:t>0.0375Hz</a:t>
+            </a:r>
+          </a:p>
+        </p:txBody>
+      </p:sp>
+      <p:sp>
+        <p:nvSpPr>
+          <p:cNvPr id="77" name="TextBox 76">
+            <a:extLst>
+              <a:ext uri="{FF2B5EF4-FFF2-40B4-BE49-F238E27FC236}">
+                <a16:creationId xmlns:a16="http://schemas.microsoft.com/office/drawing/2014/main" id="{B643EB9B-A31A-064C-8C09-4A67ED53A70D}"/>
+              </a:ext>
+            </a:extLst>
+          </p:cNvPr>
+          <p:cNvSpPr txBox="1"/>
+          <p:nvPr/>
+        </p:nvSpPr>
+        <p:spPr>
+          <a:xfrm>
+            <a:off x="1189205" y="515080"/>
+            <a:ext cx="6036653" cy="369332"/>
+          </a:xfrm>
+          <a:prstGeom prst="rect">
+            <a:avLst/>
+          </a:prstGeom>
+          <a:noFill/>
+        </p:spPr>
+        <p:txBody>
+          <a:bodyPr wrap="none" rtlCol="0">
+            <a:spAutoFit/>
+          </a:bodyPr>
+          <a:lstStyle/>
+          <a:p>
+            <a:r>
+              <a:rPr lang="en-US" dirty="0"/>
+              <a:t>File name: creat_sim_timeseries-v3-WithNoise_FrequencyShift</a:t>
+            </a:r>
+          </a:p>
+        </p:txBody>
+      </p:sp>
+      <p:sp>
+        <p:nvSpPr>
+          <p:cNvPr id="78" name="TextBox 77">
+            <a:extLst>
+              <a:ext uri="{FF2B5EF4-FFF2-40B4-BE49-F238E27FC236}">
+                <a16:creationId xmlns:a16="http://schemas.microsoft.com/office/drawing/2014/main" id="{4A8071D8-24CD-724C-8634-351302C05D65}"/>
+              </a:ext>
+            </a:extLst>
+          </p:cNvPr>
+          <p:cNvSpPr txBox="1"/>
+          <p:nvPr/>
+        </p:nvSpPr>
+        <p:spPr>
+          <a:xfrm>
+            <a:off x="9557997" y="103472"/>
+            <a:ext cx="970137" cy="830997"/>
+          </a:xfrm>
+          <a:prstGeom prst="rect">
+            <a:avLst/>
+          </a:prstGeom>
+          <a:noFill/>
+        </p:spPr>
+        <p:txBody>
+          <a:bodyPr wrap="none" rtlCol="0">
+            <a:spAutoFit/>
+          </a:bodyPr>
+          <a:lstStyle/>
+          <a:p>
+            <a:r>
+              <a:rPr lang="en-US" sz="1200" dirty="0"/>
+              <a:t>Amplitude</a:t>
+            </a:r>
+          </a:p>
+          <a:p>
+            <a:r>
+              <a:rPr lang="en-US" sz="1200" dirty="0"/>
+              <a:t>Signal 1 = 50</a:t>
+            </a:r>
+          </a:p>
+          <a:p>
+            <a:r>
+              <a:rPr lang="en-US" sz="1200" dirty="0"/>
+              <a:t>Signal 2= 47</a:t>
+            </a:r>
+          </a:p>
+          <a:p>
+            <a:r>
+              <a:rPr lang="en-US" sz="1200" dirty="0"/>
+              <a:t>Noise = 5 </a:t>
+            </a:r>
+          </a:p>
+        </p:txBody>
+      </p:sp>
+      <p:sp>
+        <p:nvSpPr>
+          <p:cNvPr id="79" name="TextBox 78">
+            <a:extLst>
+              <a:ext uri="{FF2B5EF4-FFF2-40B4-BE49-F238E27FC236}">
+                <a16:creationId xmlns:a16="http://schemas.microsoft.com/office/drawing/2014/main" id="{A944CF67-49EE-DD40-AC1E-CAF8FFA320C5}"/>
+              </a:ext>
+            </a:extLst>
+          </p:cNvPr>
+          <p:cNvSpPr txBox="1"/>
+          <p:nvPr/>
+        </p:nvSpPr>
+        <p:spPr>
+          <a:xfrm>
+            <a:off x="13037906" y="832207"/>
+            <a:ext cx="184731" cy="369332"/>
+          </a:xfrm>
+          <a:prstGeom prst="rect">
+            <a:avLst/>
+          </a:prstGeom>
+          <a:noFill/>
+        </p:spPr>
+        <p:txBody>
+          <a:bodyPr wrap="none" rtlCol="0">
+            <a:spAutoFit/>
+          </a:bodyPr>
+          <a:lstStyle/>
+          <a:p>
+            <a:endParaRPr lang="en-US"/>
+          </a:p>
+        </p:txBody>
+      </p:sp>
+    </p:spTree>
+    <p:extLst>
+      <p:ext uri="{BB962C8B-B14F-4D97-AF65-F5344CB8AC3E}">
+        <p14:creationId xmlns:p14="http://schemas.microsoft.com/office/powerpoint/2010/main" val="49061931"/>
       </p:ext>
     </p:extLst>
   </p:cSld>

</xml_diff>